<commit_message>
Account mgmt and PPT Update
</commit_message>
<xml_diff>
--- a/PPTX/BAAS.pptx
+++ b/PPTX/BAAS.pptx
@@ -6,10 +6,10 @@
     <p:sldMasterId id="2147483692" r:id="rId2"/>
   </p:sldMasterIdLst>
   <p:notesMasterIdLst>
-    <p:notesMasterId r:id="rId11"/>
+    <p:notesMasterId r:id="rId16"/>
   </p:notesMasterIdLst>
   <p:handoutMasterIdLst>
-    <p:handoutMasterId r:id="rId12"/>
+    <p:handoutMasterId r:id="rId17"/>
   </p:handoutMasterIdLst>
   <p:sldIdLst>
     <p:sldId id="330" r:id="rId3"/>
@@ -17,9 +17,14 @@
     <p:sldId id="331" r:id="rId5"/>
     <p:sldId id="332" r:id="rId6"/>
     <p:sldId id="334" r:id="rId7"/>
-    <p:sldId id="335" r:id="rId8"/>
-    <p:sldId id="336" r:id="rId9"/>
-    <p:sldId id="337" r:id="rId10"/>
+    <p:sldId id="340" r:id="rId8"/>
+    <p:sldId id="335" r:id="rId9"/>
+    <p:sldId id="336" r:id="rId10"/>
+    <p:sldId id="339" r:id="rId11"/>
+    <p:sldId id="337" r:id="rId12"/>
+    <p:sldId id="338" r:id="rId13"/>
+    <p:sldId id="341" r:id="rId14"/>
+    <p:sldId id="342" r:id="rId15"/>
   </p:sldIdLst>
   <p:sldSz cx="12192000" cy="6858000"/>
   <p:notesSz cx="6858000" cy="9144000"/>
@@ -234,7 +239,7 @@
           <a:p>
             <a:fld id="{FA763208-4D5B-44C4-A045-6495A8B44929}" type="datetimeFigureOut">
               <a:rPr lang="en-US" smtClean="0"/>
-              <a:t>10/8/2018</a:t>
+              <a:t>10/10/2018</a:t>
             </a:fld>
             <a:endParaRPr lang="en-US"/>
           </a:p>
@@ -411,7 +416,7 @@
           <a:p>
             <a:fld id="{3389243F-B1BB-4202-BD78-416ACA555174}" type="datetimeFigureOut">
               <a:rPr lang="en-US" smtClean="0"/>
-              <a:t>10/8/2018</a:t>
+              <a:t>10/10/2018</a:t>
             </a:fld>
             <a:endParaRPr lang="en-US"/>
           </a:p>
@@ -1048,6 +1053,90 @@
     <p:extLst>
       <p:ext uri="{BB962C8B-B14F-4D97-AF65-F5344CB8AC3E}">
         <p14:creationId xmlns:p14="http://schemas.microsoft.com/office/powerpoint/2010/main" val="3851001205"/>
+      </p:ext>
+    </p:extLst>
+  </p:cSld>
+  <p:clrMapOvr>
+    <a:masterClrMapping/>
+  </p:clrMapOvr>
+</p:notes>
+</file>
+
+<file path=ppt/notesSlides/notesSlide5.xml><?xml version="1.0" encoding="utf-8"?>
+<p:notes xmlns:a="http://schemas.openxmlformats.org/drawingml/2006/main" xmlns:r="http://schemas.openxmlformats.org/officeDocument/2006/relationships" xmlns:p="http://schemas.openxmlformats.org/presentationml/2006/main">
+  <p:cSld>
+    <p:spTree>
+      <p:nvGrpSpPr>
+        <p:cNvPr id="1" name=""/>
+        <p:cNvGrpSpPr/>
+        <p:nvPr/>
+      </p:nvGrpSpPr>
+      <p:grpSpPr>
+        <a:xfrm>
+          <a:off x="0" y="0"/>
+          <a:ext cx="0" cy="0"/>
+          <a:chOff x="0" y="0"/>
+          <a:chExt cx="0" cy="0"/>
+        </a:xfrm>
+      </p:grpSpPr>
+      <p:sp>
+        <p:nvSpPr>
+          <p:cNvPr id="2" name="Slide Image Placeholder 1"/>
+          <p:cNvSpPr>
+            <a:spLocks noGrp="1" noRot="1" noChangeAspect="1"/>
+          </p:cNvSpPr>
+          <p:nvPr>
+            <p:ph type="sldImg"/>
+          </p:nvPr>
+        </p:nvSpPr>
+        <p:spPr/>
+      </p:sp>
+      <p:sp>
+        <p:nvSpPr>
+          <p:cNvPr id="3" name="Notes Placeholder 2"/>
+          <p:cNvSpPr>
+            <a:spLocks noGrp="1"/>
+          </p:cNvSpPr>
+          <p:nvPr>
+            <p:ph type="body" idx="1"/>
+          </p:nvPr>
+        </p:nvSpPr>
+        <p:spPr/>
+        <p:txBody>
+          <a:bodyPr/>
+          <a:lstStyle/>
+          <a:p>
+            <a:endParaRPr lang="en-US" dirty="0"/>
+          </a:p>
+        </p:txBody>
+      </p:sp>
+      <p:sp>
+        <p:nvSpPr>
+          <p:cNvPr id="4" name="Slide Number Placeholder 3"/>
+          <p:cNvSpPr>
+            <a:spLocks noGrp="1"/>
+          </p:cNvSpPr>
+          <p:nvPr>
+            <p:ph type="sldNum" sz="quarter" idx="5"/>
+          </p:nvPr>
+        </p:nvSpPr>
+        <p:spPr/>
+        <p:txBody>
+          <a:bodyPr/>
+          <a:lstStyle/>
+          <a:p>
+            <a:fld id="{B68D2766-C49B-4C1A-9FEE-6F146754B02B}" type="slidenum">
+              <a:rPr lang="en-US" smtClean="0"/>
+              <a:t>6</a:t>
+            </a:fld>
+            <a:endParaRPr lang="en-US"/>
+          </a:p>
+        </p:txBody>
+      </p:sp>
+    </p:spTree>
+    <p:extLst>
+      <p:ext uri="{BB962C8B-B14F-4D97-AF65-F5344CB8AC3E}">
+        <p14:creationId xmlns:p14="http://schemas.microsoft.com/office/powerpoint/2010/main" val="2176295839"/>
       </p:ext>
     </p:extLst>
   </p:cSld>
@@ -2082,7 +2171,7 @@
             <a:fld id="{18D9E8F6-4D81-4B3A-BC45-BBA4A1C9BD0F}" type="datetimeFigureOut">
               <a:rPr lang="en-US" smtClean="0"/>
               <a:pPr/>
-              <a:t>10/8/2018</a:t>
+              <a:t>10/10/2018</a:t>
             </a:fld>
             <a:endParaRPr lang="en-US"/>
           </a:p>
@@ -2410,7 +2499,7 @@
           <a:p>
             <a:fld id="{18D9E8F6-4D81-4B3A-BC45-BBA4A1C9BD0F}" type="datetimeFigureOut">
               <a:rPr lang="en-US" smtClean="0"/>
-              <a:t>10/8/2018</a:t>
+              <a:t>10/10/2018</a:t>
             </a:fld>
             <a:endParaRPr lang="en-US"/>
           </a:p>
@@ -2701,7 +2790,7 @@
           <a:p>
             <a:fld id="{18D9E8F6-4D81-4B3A-BC45-BBA4A1C9BD0F}" type="datetimeFigureOut">
               <a:rPr lang="en-US" smtClean="0"/>
-              <a:t>10/8/2018</a:t>
+              <a:t>10/10/2018</a:t>
             </a:fld>
             <a:endParaRPr lang="en-US"/>
           </a:p>
@@ -2899,7 +2988,7 @@
           <a:p>
             <a:fld id="{18D9E8F6-4D81-4B3A-BC45-BBA4A1C9BD0F}" type="datetimeFigureOut">
               <a:rPr lang="en-US" smtClean="0"/>
-              <a:t>10/8/2018</a:t>
+              <a:t>10/10/2018</a:t>
             </a:fld>
             <a:endParaRPr lang="en-US"/>
           </a:p>
@@ -3107,7 +3196,7 @@
           <a:p>
             <a:fld id="{18D9E8F6-4D81-4B3A-BC45-BBA4A1C9BD0F}" type="datetimeFigureOut">
               <a:rPr lang="en-US" smtClean="0"/>
-              <a:t>10/8/2018</a:t>
+              <a:t>10/10/2018</a:t>
             </a:fld>
             <a:endParaRPr lang="en-US"/>
           </a:p>
@@ -3849,7 +3938,7 @@
             <a:fld id="{18D9E8F6-4D81-4B3A-BC45-BBA4A1C9BD0F}" type="datetimeFigureOut">
               <a:rPr lang="en-US" smtClean="0"/>
               <a:pPr/>
-              <a:t>10/8/2018</a:t>
+              <a:t>10/10/2018</a:t>
             </a:fld>
             <a:endParaRPr lang="en-US"/>
           </a:p>
@@ -4473,7 +4562,7 @@
             <a:fld id="{18D9E8F6-4D81-4B3A-BC45-BBA4A1C9BD0F}" type="datetimeFigureOut">
               <a:rPr lang="en-US" smtClean="0"/>
               <a:pPr/>
-              <a:t>10/8/2018</a:t>
+              <a:t>10/10/2018</a:t>
             </a:fld>
             <a:endParaRPr lang="en-US"/>
           </a:p>
@@ -5102,7 +5191,7 @@
             <a:fld id="{18D9E8F6-4D81-4B3A-BC45-BBA4A1C9BD0F}" type="datetimeFigureOut">
               <a:rPr lang="en-US" smtClean="0"/>
               <a:pPr/>
-              <a:t>10/8/2018</a:t>
+              <a:t>10/10/2018</a:t>
             </a:fld>
             <a:endParaRPr lang="en-US"/>
           </a:p>
@@ -5807,7 +5896,7 @@
           <a:p>
             <a:fld id="{18D9E8F6-4D81-4B3A-BC45-BBA4A1C9BD0F}" type="datetimeFigureOut">
               <a:rPr lang="en-US" smtClean="0"/>
-              <a:t>10/8/2018</a:t>
+              <a:t>10/10/2018</a:t>
             </a:fld>
             <a:endParaRPr lang="en-US"/>
           </a:p>
@@ -6072,7 +6161,7 @@
           <a:p>
             <a:fld id="{18D9E8F6-4D81-4B3A-BC45-BBA4A1C9BD0F}" type="datetimeFigureOut">
               <a:rPr lang="en-US" smtClean="0"/>
-              <a:t>10/8/2018</a:t>
+              <a:t>10/10/2018</a:t>
             </a:fld>
             <a:endParaRPr lang="en-US"/>
           </a:p>
@@ -6484,7 +6573,7 @@
           <a:p>
             <a:fld id="{18D9E8F6-4D81-4B3A-BC45-BBA4A1C9BD0F}" type="datetimeFigureOut">
               <a:rPr lang="en-US" smtClean="0"/>
-              <a:t>10/8/2018</a:t>
+              <a:t>10/10/2018</a:t>
             </a:fld>
             <a:endParaRPr lang="en-US"/>
           </a:p>
@@ -6625,7 +6714,7 @@
           <a:p>
             <a:fld id="{18D9E8F6-4D81-4B3A-BC45-BBA4A1C9BD0F}" type="datetimeFigureOut">
               <a:rPr lang="en-US" smtClean="0"/>
-              <a:t>10/8/2018</a:t>
+              <a:t>10/10/2018</a:t>
             </a:fld>
             <a:endParaRPr lang="en-US"/>
           </a:p>
@@ -6738,7 +6827,7 @@
           <a:p>
             <a:fld id="{18D9E8F6-4D81-4B3A-BC45-BBA4A1C9BD0F}" type="datetimeFigureOut">
               <a:rPr lang="en-US" smtClean="0"/>
-              <a:t>10/8/2018</a:t>
+              <a:t>10/10/2018</a:t>
             </a:fld>
             <a:endParaRPr lang="en-US"/>
           </a:p>
@@ -6979,7 +7068,7 @@
             <a:fld id="{18D9E8F6-4D81-4B3A-BC45-BBA4A1C9BD0F}" type="datetimeFigureOut">
               <a:rPr lang="en-US" smtClean="0"/>
               <a:pPr/>
-              <a:t>10/8/2018</a:t>
+              <a:t>10/10/2018</a:t>
             </a:fld>
             <a:endParaRPr lang="en-US"/>
           </a:p>
@@ -8343,6 +8432,2177 @@
 </p:sld>
 </file>
 
+<file path=ppt/slides/slide10.xml><?xml version="1.0" encoding="utf-8"?>
+<p:sld xmlns:a="http://schemas.openxmlformats.org/drawingml/2006/main" xmlns:r="http://schemas.openxmlformats.org/officeDocument/2006/relationships" xmlns:p="http://schemas.openxmlformats.org/presentationml/2006/main">
+  <p:cSld>
+    <p:spTree>
+      <p:nvGrpSpPr>
+        <p:cNvPr id="1" name=""/>
+        <p:cNvGrpSpPr/>
+        <p:nvPr/>
+      </p:nvGrpSpPr>
+      <p:grpSpPr>
+        <a:xfrm>
+          <a:off x="0" y="0"/>
+          <a:ext cx="0" cy="0"/>
+          <a:chOff x="0" y="0"/>
+          <a:chExt cx="0" cy="0"/>
+        </a:xfrm>
+      </p:grpSpPr>
+      <p:sp>
+        <p:nvSpPr>
+          <p:cNvPr id="5" name="Title 4">
+            <a:extLst>
+              <a:ext uri="{FF2B5EF4-FFF2-40B4-BE49-F238E27FC236}">
+                <a16:creationId xmlns:a16="http://schemas.microsoft.com/office/drawing/2014/main" id="{31B69405-59DB-4912-AE27-80180F44305C}"/>
+              </a:ext>
+            </a:extLst>
+          </p:cNvPr>
+          <p:cNvSpPr>
+            <a:spLocks noGrp="1"/>
+          </p:cNvSpPr>
+          <p:nvPr>
+            <p:ph type="title"/>
+          </p:nvPr>
+        </p:nvSpPr>
+        <p:spPr>
+          <a:xfrm>
+            <a:off x="569976" y="2856694"/>
+            <a:ext cx="11353800" cy="1325563"/>
+          </a:xfrm>
+        </p:spPr>
+        <p:txBody>
+          <a:bodyPr/>
+          <a:lstStyle/>
+          <a:p>
+            <a:pPr algn="ctr"/>
+            <a:r>
+              <a:rPr lang="en-US" dirty="0">
+                <a:solidFill>
+                  <a:schemeClr val="tx1"/>
+                </a:solidFill>
+              </a:rPr>
+              <a:t>Demo</a:t>
+            </a:r>
+          </a:p>
+        </p:txBody>
+      </p:sp>
+    </p:spTree>
+    <p:extLst>
+      <p:ext uri="{BB962C8B-B14F-4D97-AF65-F5344CB8AC3E}">
+        <p14:creationId xmlns:p14="http://schemas.microsoft.com/office/powerpoint/2010/main" val="1267626819"/>
+      </p:ext>
+    </p:extLst>
+  </p:cSld>
+  <p:clrMapOvr>
+    <a:masterClrMapping/>
+  </p:clrMapOvr>
+</p:sld>
+</file>
+
+<file path=ppt/slides/slide11.xml><?xml version="1.0" encoding="utf-8"?>
+<p:sld xmlns:a="http://schemas.openxmlformats.org/drawingml/2006/main" xmlns:r="http://schemas.openxmlformats.org/officeDocument/2006/relationships" xmlns:p="http://schemas.openxmlformats.org/presentationml/2006/main">
+  <p:cSld>
+    <p:spTree>
+      <p:nvGrpSpPr>
+        <p:cNvPr id="1" name=""/>
+        <p:cNvGrpSpPr/>
+        <p:nvPr/>
+      </p:nvGrpSpPr>
+      <p:grpSpPr>
+        <a:xfrm>
+          <a:off x="0" y="0"/>
+          <a:ext cx="0" cy="0"/>
+          <a:chOff x="0" y="0"/>
+          <a:chExt cx="0" cy="0"/>
+        </a:xfrm>
+      </p:grpSpPr>
+      <p:sp>
+        <p:nvSpPr>
+          <p:cNvPr id="5" name="Title 2">
+            <a:extLst>
+              <a:ext uri="{FF2B5EF4-FFF2-40B4-BE49-F238E27FC236}">
+                <a16:creationId xmlns:a16="http://schemas.microsoft.com/office/drawing/2014/main" id="{BED4082D-C8ED-4F5D-B8A4-06F015E90E77}"/>
+              </a:ext>
+            </a:extLst>
+          </p:cNvPr>
+          <p:cNvSpPr>
+            <a:spLocks noGrp="1"/>
+          </p:cNvSpPr>
+          <p:nvPr>
+            <p:ph type="title"/>
+          </p:nvPr>
+        </p:nvSpPr>
+        <p:spPr>
+          <a:xfrm>
+            <a:off x="838200" y="15958"/>
+            <a:ext cx="11353800" cy="1325563"/>
+          </a:xfrm>
+        </p:spPr>
+        <p:txBody>
+          <a:bodyPr/>
+          <a:lstStyle/>
+          <a:p>
+            <a:r>
+              <a:rPr lang="en-US" dirty="0"/>
+              <a:t>Concept of Gas</a:t>
+            </a:r>
+          </a:p>
+        </p:txBody>
+      </p:sp>
+      <p:sp>
+        <p:nvSpPr>
+          <p:cNvPr id="6" name="Rectangle 5">
+            <a:extLst>
+              <a:ext uri="{FF2B5EF4-FFF2-40B4-BE49-F238E27FC236}">
+                <a16:creationId xmlns:a16="http://schemas.microsoft.com/office/drawing/2014/main" id="{ABCADFAC-F669-40A5-90B0-F8C36683E977}"/>
+              </a:ext>
+            </a:extLst>
+          </p:cNvPr>
+          <p:cNvSpPr/>
+          <p:nvPr/>
+        </p:nvSpPr>
+        <p:spPr>
+          <a:xfrm>
+            <a:off x="196471" y="1731264"/>
+            <a:ext cx="11716637" cy="369332"/>
+          </a:xfrm>
+          <a:prstGeom prst="rect">
+            <a:avLst/>
+          </a:prstGeom>
+        </p:spPr>
+        <p:txBody>
+          <a:bodyPr wrap="square">
+            <a:spAutoFit/>
+          </a:bodyPr>
+          <a:lstStyle/>
+          <a:p>
+            <a:r>
+              <a:rPr lang="en-US" dirty="0">
+                <a:solidFill>
+                  <a:srgbClr val="13212F"/>
+                </a:solidFill>
+                <a:latin typeface="SegoeUI"/>
+              </a:rPr>
+              <a:t>Gas is a unit that measures the amount of computational effort that it will take to execute certain operations.</a:t>
+            </a:r>
+            <a:endParaRPr lang="en-US" dirty="0"/>
+          </a:p>
+        </p:txBody>
+      </p:sp>
+      <p:graphicFrame>
+        <p:nvGraphicFramePr>
+          <p:cNvPr id="7" name="Table 6">
+            <a:extLst>
+              <a:ext uri="{FF2B5EF4-FFF2-40B4-BE49-F238E27FC236}">
+                <a16:creationId xmlns:a16="http://schemas.microsoft.com/office/drawing/2014/main" id="{546D42AB-5B96-4498-B1FB-C2930CE7E686}"/>
+              </a:ext>
+            </a:extLst>
+          </p:cNvPr>
+          <p:cNvGraphicFramePr>
+            <a:graphicFrameLocks noGrp="1"/>
+          </p:cNvGraphicFramePr>
+          <p:nvPr>
+            <p:extLst>
+              <p:ext uri="{D42A27DB-BD31-4B8C-83A1-F6EECF244321}">
+                <p14:modId xmlns:p14="http://schemas.microsoft.com/office/powerpoint/2010/main" val="1546329871"/>
+              </p:ext>
+            </p:extLst>
+          </p:nvPr>
+        </p:nvGraphicFramePr>
+        <p:xfrm>
+          <a:off x="196471" y="2183631"/>
+          <a:ext cx="4793613" cy="3631954"/>
+        </p:xfrm>
+        <a:graphic>
+          <a:graphicData uri="http://schemas.openxmlformats.org/drawingml/2006/table">
+            <a:tbl>
+              <a:tblPr firstRow="1" bandRow="1">
+                <a:tableStyleId>{F5AB1C69-6EDB-4FF4-983F-18BD219EF322}</a:tableStyleId>
+              </a:tblPr>
+              <a:tblGrid>
+                <a:gridCol w="1792811">
+                  <a:extLst>
+                    <a:ext uri="{9D8B030D-6E8A-4147-A177-3AD203B41FA5}">
+                      <a16:colId xmlns:a16="http://schemas.microsoft.com/office/drawing/2014/main" val="3130320795"/>
+                    </a:ext>
+                  </a:extLst>
+                </a:gridCol>
+                <a:gridCol w="3000802">
+                  <a:extLst>
+                    <a:ext uri="{9D8B030D-6E8A-4147-A177-3AD203B41FA5}">
+                      <a16:colId xmlns:a16="http://schemas.microsoft.com/office/drawing/2014/main" val="368348431"/>
+                    </a:ext>
+                  </a:extLst>
+                </a:gridCol>
+              </a:tblGrid>
+              <a:tr h="649115">
+                <a:tc gridSpan="2">
+                  <a:txBody>
+                    <a:bodyPr/>
+                    <a:lstStyle/>
+                    <a:p>
+                      <a:r>
+                        <a:rPr lang="en-US" dirty="0"/>
+                        <a:t>Driving Car Analogy</a:t>
+                      </a:r>
+                    </a:p>
+                  </a:txBody>
+                  <a:tcPr/>
+                </a:tc>
+                <a:tc hMerge="1">
+                  <a:txBody>
+                    <a:bodyPr/>
+                    <a:lstStyle/>
+                    <a:p>
+                      <a:endParaRPr lang="en-US" dirty="0"/>
+                    </a:p>
+                  </a:txBody>
+                  <a:tcPr/>
+                </a:tc>
+                <a:extLst>
+                  <a:ext uri="{0D108BD9-81ED-4DB2-BD59-A6C34878D82A}">
+                    <a16:rowId xmlns:a16="http://schemas.microsoft.com/office/drawing/2014/main" val="3282461780"/>
+                  </a:ext>
+                </a:extLst>
+              </a:tr>
+              <a:tr h="1205499">
+                <a:tc>
+                  <a:txBody>
+                    <a:bodyPr/>
+                    <a:lstStyle/>
+                    <a:p>
+                      <a:r>
+                        <a:rPr lang="en-US" sz="1800" b="0" i="0" kern="1200" dirty="0">
+                          <a:solidFill>
+                            <a:schemeClr val="dk1"/>
+                          </a:solidFill>
+                          <a:effectLst/>
+                          <a:latin typeface="+mn-lt"/>
+                          <a:ea typeface="+mn-ea"/>
+                          <a:cs typeface="+mn-cs"/>
+                        </a:rPr>
+                        <a:t>Driving the car is the operation that you want to execute.</a:t>
+                      </a:r>
+                      <a:endParaRPr lang="en-US" dirty="0"/>
+                    </a:p>
+                  </a:txBody>
+                  <a:tcPr/>
+                </a:tc>
+                <a:tc>
+                  <a:txBody>
+                    <a:bodyPr/>
+                    <a:lstStyle/>
+                    <a:p>
+                      <a:r>
+                        <a:rPr lang="en-US" sz="1800" b="0" i="0" kern="1200" dirty="0">
+                          <a:solidFill>
+                            <a:schemeClr val="dk1"/>
+                          </a:solidFill>
+                          <a:effectLst/>
+                          <a:latin typeface="+mn-lt"/>
+                          <a:ea typeface="+mn-ea"/>
+                          <a:cs typeface="+mn-cs"/>
+                        </a:rPr>
+                        <a:t>Equivalent to executing a function of a smart contract.</a:t>
+                      </a:r>
+                      <a:endParaRPr lang="en-US" dirty="0"/>
+                    </a:p>
+                  </a:txBody>
+                  <a:tcPr/>
+                </a:tc>
+                <a:extLst>
+                  <a:ext uri="{0D108BD9-81ED-4DB2-BD59-A6C34878D82A}">
+                    <a16:rowId xmlns:a16="http://schemas.microsoft.com/office/drawing/2014/main" val="2237441357"/>
+                  </a:ext>
+                </a:extLst>
+              </a:tr>
+              <a:tr h="376075">
+                <a:tc>
+                  <a:txBody>
+                    <a:bodyPr/>
+                    <a:lstStyle/>
+                    <a:p>
+                      <a:r>
+                        <a:rPr lang="en-US" dirty="0"/>
+                        <a:t>GAS</a:t>
+                      </a:r>
+                    </a:p>
+                  </a:txBody>
+                  <a:tcPr/>
+                </a:tc>
+                <a:tc>
+                  <a:txBody>
+                    <a:bodyPr/>
+                    <a:lstStyle/>
+                    <a:p>
+                      <a:r>
+                        <a:rPr lang="en-US" dirty="0"/>
+                        <a:t>GAS</a:t>
+                      </a:r>
+                    </a:p>
+                  </a:txBody>
+                  <a:tcPr/>
+                </a:tc>
+                <a:extLst>
+                  <a:ext uri="{0D108BD9-81ED-4DB2-BD59-A6C34878D82A}">
+                    <a16:rowId xmlns:a16="http://schemas.microsoft.com/office/drawing/2014/main" val="3461452452"/>
+                  </a:ext>
+                </a:extLst>
+              </a:tr>
+              <a:tr h="376075">
+                <a:tc>
+                  <a:txBody>
+                    <a:bodyPr/>
+                    <a:lstStyle/>
+                    <a:p>
+                      <a:r>
+                        <a:rPr lang="en-US" dirty="0"/>
+                        <a:t>GAS Station</a:t>
+                      </a:r>
+                    </a:p>
+                  </a:txBody>
+                  <a:tcPr/>
+                </a:tc>
+                <a:tc>
+                  <a:txBody>
+                    <a:bodyPr/>
+                    <a:lstStyle/>
+                    <a:p>
+                      <a:r>
+                        <a:rPr lang="en-US" dirty="0"/>
+                        <a:t>Miner</a:t>
+                      </a:r>
+                    </a:p>
+                  </a:txBody>
+                  <a:tcPr/>
+                </a:tc>
+                <a:extLst>
+                  <a:ext uri="{0D108BD9-81ED-4DB2-BD59-A6C34878D82A}">
+                    <a16:rowId xmlns:a16="http://schemas.microsoft.com/office/drawing/2014/main" val="2208677291"/>
+                  </a:ext>
+                </a:extLst>
+              </a:tr>
+              <a:tr h="649115">
+                <a:tc>
+                  <a:txBody>
+                    <a:bodyPr/>
+                    <a:lstStyle/>
+                    <a:p>
+                      <a:r>
+                        <a:rPr lang="en-US" dirty="0"/>
+                        <a:t>Money Paid to Gas Station</a:t>
+                      </a:r>
+                    </a:p>
+                  </a:txBody>
+                  <a:tcPr/>
+                </a:tc>
+                <a:tc>
+                  <a:txBody>
+                    <a:bodyPr/>
+                    <a:lstStyle/>
+                    <a:p>
+                      <a:r>
+                        <a:rPr lang="en-US" dirty="0"/>
+                        <a:t>Miner Fees</a:t>
+                      </a:r>
+                    </a:p>
+                  </a:txBody>
+                  <a:tcPr/>
+                </a:tc>
+                <a:extLst>
+                  <a:ext uri="{0D108BD9-81ED-4DB2-BD59-A6C34878D82A}">
+                    <a16:rowId xmlns:a16="http://schemas.microsoft.com/office/drawing/2014/main" val="148386141"/>
+                  </a:ext>
+                </a:extLst>
+              </a:tr>
+              <a:tr h="376075">
+                <a:tc gridSpan="2">
+                  <a:txBody>
+                    <a:bodyPr/>
+                    <a:lstStyle/>
+                    <a:p>
+                      <a:endParaRPr lang="en-US" dirty="0"/>
+                    </a:p>
+                  </a:txBody>
+                  <a:tcPr/>
+                </a:tc>
+                <a:tc hMerge="1">
+                  <a:txBody>
+                    <a:bodyPr/>
+                    <a:lstStyle/>
+                    <a:p>
+                      <a:endParaRPr lang="en-US" dirty="0"/>
+                    </a:p>
+                  </a:txBody>
+                  <a:tcPr/>
+                </a:tc>
+                <a:extLst>
+                  <a:ext uri="{0D108BD9-81ED-4DB2-BD59-A6C34878D82A}">
+                    <a16:rowId xmlns:a16="http://schemas.microsoft.com/office/drawing/2014/main" val="3928956838"/>
+                  </a:ext>
+                </a:extLst>
+              </a:tr>
+            </a:tbl>
+          </a:graphicData>
+        </a:graphic>
+      </p:graphicFrame>
+      <p:sp>
+        <p:nvSpPr>
+          <p:cNvPr id="8" name="Rectangle 7">
+            <a:extLst>
+              <a:ext uri="{FF2B5EF4-FFF2-40B4-BE49-F238E27FC236}">
+                <a16:creationId xmlns:a16="http://schemas.microsoft.com/office/drawing/2014/main" id="{3FD20894-3AAA-4692-ABBA-796E5D230C28}"/>
+              </a:ext>
+            </a:extLst>
+          </p:cNvPr>
+          <p:cNvSpPr/>
+          <p:nvPr/>
+        </p:nvSpPr>
+        <p:spPr>
+          <a:xfrm>
+            <a:off x="5120640" y="2183630"/>
+            <a:ext cx="6428357" cy="1200329"/>
+          </a:xfrm>
+          <a:prstGeom prst="rect">
+            <a:avLst/>
+          </a:prstGeom>
+        </p:spPr>
+        <p:txBody>
+          <a:bodyPr wrap="square">
+            <a:spAutoFit/>
+          </a:bodyPr>
+          <a:lstStyle/>
+          <a:p>
+            <a:r>
+              <a:rPr lang="en-US" b="1" dirty="0">
+                <a:solidFill>
+                  <a:srgbClr val="13212F"/>
+                </a:solidFill>
+                <a:latin typeface="SegoeUI"/>
+              </a:rPr>
+              <a:t>Gas limit - </a:t>
+            </a:r>
+            <a:r>
+              <a:rPr lang="en-US" dirty="0">
+                <a:solidFill>
+                  <a:srgbClr val="13212F"/>
+                </a:solidFill>
+                <a:latin typeface="SegoeUI"/>
+              </a:rPr>
+              <a:t>T</a:t>
+            </a:r>
+            <a:r>
+              <a:rPr lang="en-US" dirty="0"/>
+              <a:t>he sender of the transaction must specify a gas limit before they submit it to the network. The gas limit is the maximum amount of gas the sender is willing to pay for this transaction.</a:t>
+            </a:r>
+            <a:endParaRPr lang="en-US" b="1" dirty="0"/>
+          </a:p>
+        </p:txBody>
+      </p:sp>
+      <p:sp>
+        <p:nvSpPr>
+          <p:cNvPr id="2" name="Rectangle 1">
+            <a:extLst>
+              <a:ext uri="{FF2B5EF4-FFF2-40B4-BE49-F238E27FC236}">
+                <a16:creationId xmlns:a16="http://schemas.microsoft.com/office/drawing/2014/main" id="{ADE9059C-739E-4DAF-8981-4AE325121806}"/>
+              </a:ext>
+            </a:extLst>
+          </p:cNvPr>
+          <p:cNvSpPr/>
+          <p:nvPr/>
+        </p:nvSpPr>
+        <p:spPr>
+          <a:xfrm>
+            <a:off x="5120639" y="3383959"/>
+            <a:ext cx="6874889" cy="2369880"/>
+          </a:xfrm>
+          <a:prstGeom prst="rect">
+            <a:avLst/>
+          </a:prstGeom>
+        </p:spPr>
+        <p:txBody>
+          <a:bodyPr wrap="square">
+            <a:spAutoFit/>
+          </a:bodyPr>
+          <a:lstStyle/>
+          <a:p>
+            <a:r>
+              <a:rPr lang="en-US" dirty="0">
+                <a:solidFill>
+                  <a:srgbClr val="13212F"/>
+                </a:solidFill>
+                <a:latin typeface="SegoeUI"/>
+              </a:rPr>
+              <a:t>Suppose, we are adding two numbers with gas limit  = 120 and for that the contract must do the following actions:</a:t>
+            </a:r>
+          </a:p>
+          <a:p>
+            <a:pPr marL="285750" indent="-285750">
+              <a:buFont typeface="Arial" panose="020B0604020202020204" pitchFamily="34" charset="0"/>
+              <a:buChar char="•"/>
+            </a:pPr>
+            <a:r>
+              <a:rPr lang="en-US" sz="1600" dirty="0"/>
+              <a:t>Storing 10 in a variable. Let’s say this operation costs 45 gas.</a:t>
+            </a:r>
+          </a:p>
+          <a:p>
+            <a:pPr marL="285750" indent="-285750">
+              <a:buFont typeface="Arial" panose="020B0604020202020204" pitchFamily="34" charset="0"/>
+              <a:buChar char="•"/>
+            </a:pPr>
+            <a:r>
+              <a:rPr lang="en-US" sz="1600" dirty="0"/>
+              <a:t>Adding two variables, let’s say this costs 10 gas.</a:t>
+            </a:r>
+          </a:p>
+          <a:p>
+            <a:pPr marL="285750" indent="-285750">
+              <a:buFont typeface="Arial" panose="020B0604020202020204" pitchFamily="34" charset="0"/>
+              <a:buChar char="•"/>
+            </a:pPr>
+            <a:r>
+              <a:rPr lang="en-US" sz="1600" dirty="0"/>
+              <a:t>Storing the result which again costs 45 gas.</a:t>
+            </a:r>
+          </a:p>
+          <a:p>
+            <a:r>
+              <a:rPr lang="en-US" sz="1600" dirty="0"/>
+              <a:t>Total Gas = 100 gas</a:t>
+            </a:r>
+          </a:p>
+          <a:p>
+            <a:r>
+              <a:rPr lang="en-US" sz="1600" dirty="0"/>
+              <a:t>Fee owed (miner) 1 gas = 20 </a:t>
+            </a:r>
+            <a:r>
+              <a:rPr lang="en-US" sz="1600" dirty="0" err="1"/>
+              <a:t>Gwei</a:t>
+            </a:r>
+            <a:r>
+              <a:rPr lang="en-US" sz="1600" dirty="0"/>
+              <a:t> is </a:t>
+            </a:r>
+          </a:p>
+          <a:p>
+            <a:r>
+              <a:rPr lang="en-US" sz="1600" dirty="0"/>
+              <a:t>(100 * </a:t>
+            </a:r>
+            <a:r>
+              <a:rPr lang="en-US" sz="1600" dirty="0">
+                <a:hlinkClick r:id="rId2"/>
+              </a:rPr>
+              <a:t>20 </a:t>
+            </a:r>
+            <a:r>
+              <a:rPr lang="en-US" sz="1600" dirty="0" err="1">
+                <a:hlinkClick r:id="rId2"/>
+              </a:rPr>
+              <a:t>Gwei</a:t>
+            </a:r>
+            <a:r>
+              <a:rPr lang="en-US" sz="1600" dirty="0"/>
+              <a:t>) = 0.000002 ETH.</a:t>
+            </a:r>
+          </a:p>
+          <a:p>
+            <a:r>
+              <a:rPr lang="en-US" sz="1600" dirty="0"/>
+              <a:t>The 20 unused gas is returned back to the sender</a:t>
+            </a:r>
+          </a:p>
+        </p:txBody>
+      </p:sp>
+      <p:sp>
+        <p:nvSpPr>
+          <p:cNvPr id="3" name="Rectangle 2">
+            <a:extLst>
+              <a:ext uri="{FF2B5EF4-FFF2-40B4-BE49-F238E27FC236}">
+                <a16:creationId xmlns:a16="http://schemas.microsoft.com/office/drawing/2014/main" id="{0F6D968A-21C6-4EDD-B9CA-63A6FE5A3B5B}"/>
+              </a:ext>
+            </a:extLst>
+          </p:cNvPr>
+          <p:cNvSpPr/>
+          <p:nvPr/>
+        </p:nvSpPr>
+        <p:spPr>
+          <a:xfrm>
+            <a:off x="5132828" y="5753839"/>
+            <a:ext cx="6278881" cy="738664"/>
+          </a:xfrm>
+          <a:prstGeom prst="rect">
+            <a:avLst/>
+          </a:prstGeom>
+        </p:spPr>
+        <p:txBody>
+          <a:bodyPr wrap="square">
+            <a:spAutoFit/>
+          </a:bodyPr>
+          <a:lstStyle/>
+          <a:p>
+            <a:r>
+              <a:rPr lang="en-US" sz="1400" dirty="0">
+                <a:solidFill>
+                  <a:srgbClr val="13212F"/>
+                </a:solidFill>
+                <a:latin typeface="SegoeUI"/>
+              </a:rPr>
+              <a:t>If an operation runs out of gas the operation generator must STILL pay the miners the fee for their computational costs and the operation gets added to the blockchain (even if it has not been executed).</a:t>
+            </a:r>
+            <a:endParaRPr lang="en-US" sz="1400" dirty="0"/>
+          </a:p>
+        </p:txBody>
+      </p:sp>
+    </p:spTree>
+    <p:extLst>
+      <p:ext uri="{BB962C8B-B14F-4D97-AF65-F5344CB8AC3E}">
+        <p14:creationId xmlns:p14="http://schemas.microsoft.com/office/powerpoint/2010/main" val="3247151688"/>
+      </p:ext>
+    </p:extLst>
+  </p:cSld>
+  <p:clrMapOvr>
+    <a:masterClrMapping/>
+  </p:clrMapOvr>
+</p:sld>
+</file>
+
+<file path=ppt/slides/slide12.xml><?xml version="1.0" encoding="utf-8"?>
+<p:sld xmlns:a="http://schemas.openxmlformats.org/drawingml/2006/main" xmlns:r="http://schemas.openxmlformats.org/officeDocument/2006/relationships" xmlns:p="http://schemas.openxmlformats.org/presentationml/2006/main">
+  <p:cSld>
+    <p:spTree>
+      <p:nvGrpSpPr>
+        <p:cNvPr id="1" name=""/>
+        <p:cNvGrpSpPr/>
+        <p:nvPr/>
+      </p:nvGrpSpPr>
+      <p:grpSpPr>
+        <a:xfrm>
+          <a:off x="0" y="0"/>
+          <a:ext cx="0" cy="0"/>
+          <a:chOff x="0" y="0"/>
+          <a:chExt cx="0" cy="0"/>
+        </a:xfrm>
+      </p:grpSpPr>
+      <p:sp>
+        <p:nvSpPr>
+          <p:cNvPr id="11" name="Title 10">
+            <a:extLst>
+              <a:ext uri="{FF2B5EF4-FFF2-40B4-BE49-F238E27FC236}">
+                <a16:creationId xmlns:a16="http://schemas.microsoft.com/office/drawing/2014/main" id="{6D99CBAD-FA49-43FD-B42E-FF9E8DAA4BE0}"/>
+              </a:ext>
+            </a:extLst>
+          </p:cNvPr>
+          <p:cNvSpPr>
+            <a:spLocks noGrp="1"/>
+          </p:cNvSpPr>
+          <p:nvPr>
+            <p:ph type="title"/>
+          </p:nvPr>
+        </p:nvSpPr>
+        <p:spPr/>
+        <p:txBody>
+          <a:bodyPr/>
+          <a:lstStyle/>
+          <a:p>
+            <a:endParaRPr lang="en-US"/>
+          </a:p>
+        </p:txBody>
+      </p:sp>
+    </p:spTree>
+    <p:extLst>
+      <p:ext uri="{BB962C8B-B14F-4D97-AF65-F5344CB8AC3E}">
+        <p14:creationId xmlns:p14="http://schemas.microsoft.com/office/powerpoint/2010/main" val="4183868056"/>
+      </p:ext>
+    </p:extLst>
+  </p:cSld>
+  <p:clrMapOvr>
+    <a:masterClrMapping/>
+  </p:clrMapOvr>
+</p:sld>
+</file>
+
+<file path=ppt/slides/slide13.xml><?xml version="1.0" encoding="utf-8"?>
+<p:sld xmlns:a="http://schemas.openxmlformats.org/drawingml/2006/main" xmlns:r="http://schemas.openxmlformats.org/officeDocument/2006/relationships" xmlns:p="http://schemas.openxmlformats.org/presentationml/2006/main">
+  <p:cSld>
+    <p:spTree>
+      <p:nvGrpSpPr>
+        <p:cNvPr id="1" name=""/>
+        <p:cNvGrpSpPr/>
+        <p:nvPr/>
+      </p:nvGrpSpPr>
+      <p:grpSpPr>
+        <a:xfrm>
+          <a:off x="0" y="0"/>
+          <a:ext cx="0" cy="0"/>
+          <a:chOff x="0" y="0"/>
+          <a:chExt cx="0" cy="0"/>
+        </a:xfrm>
+      </p:grpSpPr>
+      <p:sp>
+        <p:nvSpPr>
+          <p:cNvPr id="2" name="Title 2">
+            <a:extLst>
+              <a:ext uri="{FF2B5EF4-FFF2-40B4-BE49-F238E27FC236}">
+                <a16:creationId xmlns:a16="http://schemas.microsoft.com/office/drawing/2014/main" id="{49AEFD99-5685-4CF6-B448-5794F01EE93F}"/>
+              </a:ext>
+            </a:extLst>
+          </p:cNvPr>
+          <p:cNvSpPr txBox="1">
+            <a:spLocks/>
+          </p:cNvSpPr>
+          <p:nvPr/>
+        </p:nvSpPr>
+        <p:spPr>
+          <a:xfrm>
+            <a:off x="838200" y="52535"/>
+            <a:ext cx="11353800" cy="678986"/>
+          </a:xfrm>
+          <a:prstGeom prst="rect">
+            <a:avLst/>
+          </a:prstGeom>
+        </p:spPr>
+        <p:txBody>
+          <a:bodyPr>
+            <a:normAutofit fontScale="97500"/>
+          </a:bodyPr>
+          <a:lstStyle>
+            <a:lvl1pPr algn="l" defTabSz="914400" rtl="0" eaLnBrk="1" latinLnBrk="0" hangingPunct="1">
+              <a:lnSpc>
+                <a:spcPct val="90000"/>
+              </a:lnSpc>
+              <a:spcBef>
+                <a:spcPct val="0"/>
+              </a:spcBef>
+              <a:buNone/>
+              <a:defRPr lang="en-US" sz="4800" b="1" kern="1200" cap="all" baseline="0" smtClean="0">
+                <a:solidFill>
+                  <a:schemeClr val="bg1"/>
+                </a:solidFill>
+                <a:latin typeface="+mj-lt"/>
+                <a:ea typeface="+mj-ea"/>
+                <a:cs typeface="+mj-cs"/>
+              </a:defRPr>
+            </a:lvl1pPr>
+          </a:lstStyle>
+          <a:p>
+            <a:pPr algn="r"/>
+            <a:r>
+              <a:rPr lang="en-US" sz="3200" dirty="0">
+                <a:solidFill>
+                  <a:schemeClr val="tx1"/>
+                </a:solidFill>
+              </a:rPr>
+              <a:t>Asset transfer Smart contract</a:t>
+            </a:r>
+          </a:p>
+        </p:txBody>
+      </p:sp>
+      <p:sp>
+        <p:nvSpPr>
+          <p:cNvPr id="3" name="Oval 2">
+            <a:extLst>
+              <a:ext uri="{FF2B5EF4-FFF2-40B4-BE49-F238E27FC236}">
+                <a16:creationId xmlns:a16="http://schemas.microsoft.com/office/drawing/2014/main" id="{242A040E-0CE9-451C-AD14-DB2F1CBA7DB5}"/>
+              </a:ext>
+            </a:extLst>
+          </p:cNvPr>
+          <p:cNvSpPr/>
+          <p:nvPr/>
+        </p:nvSpPr>
+        <p:spPr>
+          <a:xfrm>
+            <a:off x="463296" y="1328928"/>
+            <a:ext cx="1426464" cy="1325562"/>
+          </a:xfrm>
+          <a:prstGeom prst="ellipse">
+            <a:avLst/>
+          </a:prstGeom>
+          <a:ln>
+            <a:solidFill>
+              <a:schemeClr val="tx1"/>
+            </a:solidFill>
+          </a:ln>
+        </p:spPr>
+        <p:style>
+          <a:lnRef idx="2">
+            <a:schemeClr val="accent6"/>
+          </a:lnRef>
+          <a:fillRef idx="1">
+            <a:schemeClr val="lt1"/>
+          </a:fillRef>
+          <a:effectRef idx="0">
+            <a:schemeClr val="accent6"/>
+          </a:effectRef>
+          <a:fontRef idx="minor">
+            <a:schemeClr val="dk1"/>
+          </a:fontRef>
+        </p:style>
+        <p:txBody>
+          <a:bodyPr rot="0" spcFirstLastPara="0" vertOverflow="overflow" horzOverflow="overflow" vert="horz" wrap="square" lIns="91440" tIns="45720" rIns="91440" bIns="45720" numCol="1" spcCol="0" rtlCol="0" fromWordArt="0" anchor="ctr" anchorCtr="0" forceAA="0" compatLnSpc="1">
+            <a:prstTxWarp prst="textNoShape">
+              <a:avLst/>
+            </a:prstTxWarp>
+            <a:noAutofit/>
+          </a:bodyPr>
+          <a:lstStyle/>
+          <a:p>
+            <a:pPr algn="ctr"/>
+            <a:r>
+              <a:rPr lang="en-US" dirty="0">
+                <a:solidFill>
+                  <a:schemeClr val="dk1"/>
+                </a:solidFill>
+              </a:rPr>
+              <a:t>Make</a:t>
+            </a:r>
+          </a:p>
+          <a:p>
+            <a:pPr algn="ctr"/>
+            <a:r>
+              <a:rPr lang="en-US" dirty="0"/>
+              <a:t>Offer</a:t>
+            </a:r>
+            <a:endParaRPr lang="en-US" dirty="0">
+              <a:solidFill>
+                <a:schemeClr val="dk1"/>
+              </a:solidFill>
+            </a:endParaRPr>
+          </a:p>
+        </p:txBody>
+      </p:sp>
+      <p:sp>
+        <p:nvSpPr>
+          <p:cNvPr id="4" name="Oval 3">
+            <a:extLst>
+              <a:ext uri="{FF2B5EF4-FFF2-40B4-BE49-F238E27FC236}">
+                <a16:creationId xmlns:a16="http://schemas.microsoft.com/office/drawing/2014/main" id="{BAFB88A2-FAC1-45C1-94AE-ECF6E7B3AB18}"/>
+              </a:ext>
+            </a:extLst>
+          </p:cNvPr>
+          <p:cNvSpPr/>
+          <p:nvPr/>
+        </p:nvSpPr>
+        <p:spPr>
+          <a:xfrm>
+            <a:off x="2395728" y="1328928"/>
+            <a:ext cx="1426464" cy="1325562"/>
+          </a:xfrm>
+          <a:prstGeom prst="ellipse">
+            <a:avLst/>
+          </a:prstGeom>
+          <a:ln>
+            <a:solidFill>
+              <a:schemeClr val="tx1"/>
+            </a:solidFill>
+          </a:ln>
+        </p:spPr>
+        <p:style>
+          <a:lnRef idx="2">
+            <a:schemeClr val="accent6"/>
+          </a:lnRef>
+          <a:fillRef idx="1">
+            <a:schemeClr val="lt1"/>
+          </a:fillRef>
+          <a:effectRef idx="0">
+            <a:schemeClr val="accent6"/>
+          </a:effectRef>
+          <a:fontRef idx="minor">
+            <a:schemeClr val="dk1"/>
+          </a:fontRef>
+        </p:style>
+        <p:txBody>
+          <a:bodyPr rtlCol="0" anchor="ctr"/>
+          <a:lstStyle/>
+          <a:p>
+            <a:pPr algn="ctr"/>
+            <a:r>
+              <a:rPr lang="en-US" dirty="0"/>
+              <a:t>Accept Offer</a:t>
+            </a:r>
+          </a:p>
+        </p:txBody>
+      </p:sp>
+      <p:sp>
+        <p:nvSpPr>
+          <p:cNvPr id="5" name="Oval 4">
+            <a:extLst>
+              <a:ext uri="{FF2B5EF4-FFF2-40B4-BE49-F238E27FC236}">
+                <a16:creationId xmlns:a16="http://schemas.microsoft.com/office/drawing/2014/main" id="{63D8FE90-2A4E-49C2-9B61-6CE0F0DF8BD0}"/>
+              </a:ext>
+            </a:extLst>
+          </p:cNvPr>
+          <p:cNvSpPr/>
+          <p:nvPr/>
+        </p:nvSpPr>
+        <p:spPr>
+          <a:xfrm>
+            <a:off x="4675634" y="348190"/>
+            <a:ext cx="1597152" cy="1578864"/>
+          </a:xfrm>
+          <a:prstGeom prst="ellipse">
+            <a:avLst/>
+          </a:prstGeom>
+          <a:ln>
+            <a:solidFill>
+              <a:schemeClr val="tx1"/>
+            </a:solidFill>
+          </a:ln>
+        </p:spPr>
+        <p:style>
+          <a:lnRef idx="2">
+            <a:schemeClr val="accent6"/>
+          </a:lnRef>
+          <a:fillRef idx="1">
+            <a:schemeClr val="lt1"/>
+          </a:fillRef>
+          <a:effectRef idx="0">
+            <a:schemeClr val="accent6"/>
+          </a:effectRef>
+          <a:fontRef idx="minor">
+            <a:schemeClr val="dk1"/>
+          </a:fontRef>
+        </p:style>
+        <p:txBody>
+          <a:bodyPr rtlCol="0" anchor="ctr"/>
+          <a:lstStyle/>
+          <a:p>
+            <a:pPr algn="ctr"/>
+            <a:r>
+              <a:rPr lang="en-US" dirty="0"/>
+              <a:t>Mark Inspected</a:t>
+            </a:r>
+          </a:p>
+        </p:txBody>
+      </p:sp>
+      <p:sp>
+        <p:nvSpPr>
+          <p:cNvPr id="6" name="Oval 5">
+            <a:extLst>
+              <a:ext uri="{FF2B5EF4-FFF2-40B4-BE49-F238E27FC236}">
+                <a16:creationId xmlns:a16="http://schemas.microsoft.com/office/drawing/2014/main" id="{5C104275-0D7F-4167-B868-D733A833C8DA}"/>
+              </a:ext>
+            </a:extLst>
+          </p:cNvPr>
+          <p:cNvSpPr/>
+          <p:nvPr/>
+        </p:nvSpPr>
+        <p:spPr>
+          <a:xfrm>
+            <a:off x="4745737" y="2222709"/>
+            <a:ext cx="1597152" cy="1471866"/>
+          </a:xfrm>
+          <a:prstGeom prst="ellipse">
+            <a:avLst/>
+          </a:prstGeom>
+          <a:ln>
+            <a:solidFill>
+              <a:schemeClr val="tx1"/>
+            </a:solidFill>
+          </a:ln>
+        </p:spPr>
+        <p:style>
+          <a:lnRef idx="2">
+            <a:schemeClr val="accent6"/>
+          </a:lnRef>
+          <a:fillRef idx="1">
+            <a:schemeClr val="lt1"/>
+          </a:fillRef>
+          <a:effectRef idx="0">
+            <a:schemeClr val="accent6"/>
+          </a:effectRef>
+          <a:fontRef idx="minor">
+            <a:schemeClr val="dk1"/>
+          </a:fontRef>
+        </p:style>
+        <p:txBody>
+          <a:bodyPr rtlCol="0" anchor="ctr"/>
+          <a:lstStyle/>
+          <a:p>
+            <a:pPr algn="ctr"/>
+            <a:r>
+              <a:rPr lang="en-US" dirty="0"/>
+              <a:t>Mark Appraised</a:t>
+            </a:r>
+          </a:p>
+        </p:txBody>
+      </p:sp>
+      <p:sp>
+        <p:nvSpPr>
+          <p:cNvPr id="7" name="Oval 6">
+            <a:extLst>
+              <a:ext uri="{FF2B5EF4-FFF2-40B4-BE49-F238E27FC236}">
+                <a16:creationId xmlns:a16="http://schemas.microsoft.com/office/drawing/2014/main" id="{EE7FCB34-1199-4A43-AA1D-35F1CF93F378}"/>
+              </a:ext>
+            </a:extLst>
+          </p:cNvPr>
+          <p:cNvSpPr/>
+          <p:nvPr/>
+        </p:nvSpPr>
+        <p:spPr>
+          <a:xfrm>
+            <a:off x="7266434" y="1188720"/>
+            <a:ext cx="1822700" cy="1809146"/>
+          </a:xfrm>
+          <a:prstGeom prst="ellipse">
+            <a:avLst/>
+          </a:prstGeom>
+          <a:ln>
+            <a:solidFill>
+              <a:schemeClr val="tx1"/>
+            </a:solidFill>
+          </a:ln>
+        </p:spPr>
+        <p:style>
+          <a:lnRef idx="2">
+            <a:schemeClr val="accent6"/>
+          </a:lnRef>
+          <a:fillRef idx="1">
+            <a:schemeClr val="lt1"/>
+          </a:fillRef>
+          <a:effectRef idx="0">
+            <a:schemeClr val="accent6"/>
+          </a:effectRef>
+          <a:fontRef idx="minor">
+            <a:schemeClr val="dk1"/>
+          </a:fontRef>
+        </p:style>
+        <p:txBody>
+          <a:bodyPr rtlCol="0" anchor="ctr"/>
+          <a:lstStyle/>
+          <a:p>
+            <a:pPr algn="ctr"/>
+            <a:r>
+              <a:rPr lang="en-US" dirty="0"/>
+              <a:t>Accepted</a:t>
+            </a:r>
+          </a:p>
+        </p:txBody>
+      </p:sp>
+      <p:sp>
+        <p:nvSpPr>
+          <p:cNvPr id="8" name="Oval 7">
+            <a:extLst>
+              <a:ext uri="{FF2B5EF4-FFF2-40B4-BE49-F238E27FC236}">
+                <a16:creationId xmlns:a16="http://schemas.microsoft.com/office/drawing/2014/main" id="{CD30FC20-076F-43F1-A368-8718100020D3}"/>
+              </a:ext>
+            </a:extLst>
+          </p:cNvPr>
+          <p:cNvSpPr/>
+          <p:nvPr/>
+        </p:nvSpPr>
+        <p:spPr>
+          <a:xfrm>
+            <a:off x="9784084" y="1202276"/>
+            <a:ext cx="1822700" cy="1809147"/>
+          </a:xfrm>
+          <a:prstGeom prst="ellipse">
+            <a:avLst/>
+          </a:prstGeom>
+          <a:ln>
+            <a:solidFill>
+              <a:schemeClr val="tx1"/>
+            </a:solidFill>
+          </a:ln>
+        </p:spPr>
+        <p:style>
+          <a:lnRef idx="2">
+            <a:schemeClr val="accent6"/>
+          </a:lnRef>
+          <a:fillRef idx="1">
+            <a:schemeClr val="lt1"/>
+          </a:fillRef>
+          <a:effectRef idx="0">
+            <a:schemeClr val="accent6"/>
+          </a:effectRef>
+          <a:fontRef idx="minor">
+            <a:schemeClr val="dk1"/>
+          </a:fontRef>
+        </p:style>
+        <p:txBody>
+          <a:bodyPr rtlCol="0" anchor="ctr"/>
+          <a:lstStyle/>
+          <a:p>
+            <a:pPr algn="ctr"/>
+            <a:r>
+              <a:rPr lang="en-US" dirty="0"/>
+              <a:t>Transferred</a:t>
+            </a:r>
+          </a:p>
+        </p:txBody>
+      </p:sp>
+      <p:cxnSp>
+        <p:nvCxnSpPr>
+          <p:cNvPr id="10" name="Straight Arrow Connector 9">
+            <a:extLst>
+              <a:ext uri="{FF2B5EF4-FFF2-40B4-BE49-F238E27FC236}">
+                <a16:creationId xmlns:a16="http://schemas.microsoft.com/office/drawing/2014/main" id="{74168A95-B2A6-42F7-A376-DAF7D2B92A47}"/>
+              </a:ext>
+            </a:extLst>
+          </p:cNvPr>
+          <p:cNvCxnSpPr>
+            <a:cxnSpLocks/>
+            <a:stCxn id="3" idx="6"/>
+            <a:endCxn id="4" idx="2"/>
+          </p:cNvCxnSpPr>
+          <p:nvPr/>
+        </p:nvCxnSpPr>
+        <p:spPr>
+          <a:xfrm>
+            <a:off x="1889760" y="1991709"/>
+            <a:ext cx="505968" cy="0"/>
+          </a:xfrm>
+          <a:prstGeom prst="straightConnector1">
+            <a:avLst/>
+          </a:prstGeom>
+          <a:ln w="38100">
+            <a:tailEnd type="triangle"/>
+          </a:ln>
+        </p:spPr>
+        <p:style>
+          <a:lnRef idx="1">
+            <a:schemeClr val="accent1"/>
+          </a:lnRef>
+          <a:fillRef idx="0">
+            <a:schemeClr val="accent1"/>
+          </a:fillRef>
+          <a:effectRef idx="0">
+            <a:schemeClr val="accent1"/>
+          </a:effectRef>
+          <a:fontRef idx="minor">
+            <a:schemeClr val="tx1"/>
+          </a:fontRef>
+        </p:style>
+      </p:cxnSp>
+      <p:cxnSp>
+        <p:nvCxnSpPr>
+          <p:cNvPr id="12" name="Straight Arrow Connector 11">
+            <a:extLst>
+              <a:ext uri="{FF2B5EF4-FFF2-40B4-BE49-F238E27FC236}">
+                <a16:creationId xmlns:a16="http://schemas.microsoft.com/office/drawing/2014/main" id="{ED856956-38A5-48A5-8EBB-D62E2C8A1439}"/>
+              </a:ext>
+            </a:extLst>
+          </p:cNvPr>
+          <p:cNvCxnSpPr>
+            <a:cxnSpLocks/>
+            <a:stCxn id="4" idx="7"/>
+            <a:endCxn id="5" idx="2"/>
+          </p:cNvCxnSpPr>
+          <p:nvPr/>
+        </p:nvCxnSpPr>
+        <p:spPr>
+          <a:xfrm flipV="1">
+            <a:off x="3613291" y="1137622"/>
+            <a:ext cx="1062343" cy="385430"/>
+          </a:xfrm>
+          <a:prstGeom prst="straightConnector1">
+            <a:avLst/>
+          </a:prstGeom>
+          <a:ln w="38100">
+            <a:tailEnd type="triangle"/>
+          </a:ln>
+        </p:spPr>
+        <p:style>
+          <a:lnRef idx="1">
+            <a:schemeClr val="accent1"/>
+          </a:lnRef>
+          <a:fillRef idx="0">
+            <a:schemeClr val="accent1"/>
+          </a:fillRef>
+          <a:effectRef idx="0">
+            <a:schemeClr val="accent1"/>
+          </a:effectRef>
+          <a:fontRef idx="minor">
+            <a:schemeClr val="tx1"/>
+          </a:fontRef>
+        </p:style>
+      </p:cxnSp>
+      <p:cxnSp>
+        <p:nvCxnSpPr>
+          <p:cNvPr id="15" name="Straight Arrow Connector 14">
+            <a:extLst>
+              <a:ext uri="{FF2B5EF4-FFF2-40B4-BE49-F238E27FC236}">
+                <a16:creationId xmlns:a16="http://schemas.microsoft.com/office/drawing/2014/main" id="{CC94C947-6422-4FDA-AA2D-944F162263ED}"/>
+              </a:ext>
+            </a:extLst>
+          </p:cNvPr>
+          <p:cNvCxnSpPr>
+            <a:cxnSpLocks/>
+            <a:stCxn id="4" idx="5"/>
+            <a:endCxn id="6" idx="2"/>
+          </p:cNvCxnSpPr>
+          <p:nvPr/>
+        </p:nvCxnSpPr>
+        <p:spPr>
+          <a:xfrm>
+            <a:off x="3613291" y="2460366"/>
+            <a:ext cx="1132446" cy="498276"/>
+          </a:xfrm>
+          <a:prstGeom prst="straightConnector1">
+            <a:avLst/>
+          </a:prstGeom>
+          <a:ln w="38100">
+            <a:tailEnd type="triangle"/>
+          </a:ln>
+        </p:spPr>
+        <p:style>
+          <a:lnRef idx="1">
+            <a:schemeClr val="accent1"/>
+          </a:lnRef>
+          <a:fillRef idx="0">
+            <a:schemeClr val="accent1"/>
+          </a:fillRef>
+          <a:effectRef idx="0">
+            <a:schemeClr val="accent1"/>
+          </a:effectRef>
+          <a:fontRef idx="minor">
+            <a:schemeClr val="tx1"/>
+          </a:fontRef>
+        </p:style>
+      </p:cxnSp>
+      <p:cxnSp>
+        <p:nvCxnSpPr>
+          <p:cNvPr id="18" name="Straight Arrow Connector 17">
+            <a:extLst>
+              <a:ext uri="{FF2B5EF4-FFF2-40B4-BE49-F238E27FC236}">
+                <a16:creationId xmlns:a16="http://schemas.microsoft.com/office/drawing/2014/main" id="{FC2D33A0-2B36-4FBB-A4F2-0097A124192F}"/>
+              </a:ext>
+            </a:extLst>
+          </p:cNvPr>
+          <p:cNvCxnSpPr>
+            <a:cxnSpLocks/>
+            <a:stCxn id="5" idx="6"/>
+            <a:endCxn id="7" idx="1"/>
+          </p:cNvCxnSpPr>
+          <p:nvPr/>
+        </p:nvCxnSpPr>
+        <p:spPr>
+          <a:xfrm>
+            <a:off x="6272786" y="1137622"/>
+            <a:ext cx="1260576" cy="316041"/>
+          </a:xfrm>
+          <a:prstGeom prst="straightConnector1">
+            <a:avLst/>
+          </a:prstGeom>
+          <a:ln w="38100">
+            <a:tailEnd type="triangle"/>
+          </a:ln>
+        </p:spPr>
+        <p:style>
+          <a:lnRef idx="1">
+            <a:schemeClr val="accent1"/>
+          </a:lnRef>
+          <a:fillRef idx="0">
+            <a:schemeClr val="accent1"/>
+          </a:fillRef>
+          <a:effectRef idx="0">
+            <a:schemeClr val="accent1"/>
+          </a:effectRef>
+          <a:fontRef idx="minor">
+            <a:schemeClr val="tx1"/>
+          </a:fontRef>
+        </p:style>
+      </p:cxnSp>
+      <p:cxnSp>
+        <p:nvCxnSpPr>
+          <p:cNvPr id="21" name="Straight Arrow Connector 20">
+            <a:extLst>
+              <a:ext uri="{FF2B5EF4-FFF2-40B4-BE49-F238E27FC236}">
+                <a16:creationId xmlns:a16="http://schemas.microsoft.com/office/drawing/2014/main" id="{FF5DB774-9428-49D8-961D-96D64E09CCDB}"/>
+              </a:ext>
+            </a:extLst>
+          </p:cNvPr>
+          <p:cNvCxnSpPr>
+            <a:cxnSpLocks/>
+            <a:stCxn id="6" idx="6"/>
+            <a:endCxn id="7" idx="3"/>
+          </p:cNvCxnSpPr>
+          <p:nvPr/>
+        </p:nvCxnSpPr>
+        <p:spPr>
+          <a:xfrm flipV="1">
+            <a:off x="6342889" y="2732923"/>
+            <a:ext cx="1190473" cy="225719"/>
+          </a:xfrm>
+          <a:prstGeom prst="straightConnector1">
+            <a:avLst/>
+          </a:prstGeom>
+          <a:ln w="38100">
+            <a:tailEnd type="triangle"/>
+          </a:ln>
+        </p:spPr>
+        <p:style>
+          <a:lnRef idx="1">
+            <a:schemeClr val="accent1"/>
+          </a:lnRef>
+          <a:fillRef idx="0">
+            <a:schemeClr val="accent1"/>
+          </a:fillRef>
+          <a:effectRef idx="0">
+            <a:schemeClr val="accent1"/>
+          </a:effectRef>
+          <a:fontRef idx="minor">
+            <a:schemeClr val="tx1"/>
+          </a:fontRef>
+        </p:style>
+      </p:cxnSp>
+      <p:cxnSp>
+        <p:nvCxnSpPr>
+          <p:cNvPr id="24" name="Straight Arrow Connector 23">
+            <a:extLst>
+              <a:ext uri="{FF2B5EF4-FFF2-40B4-BE49-F238E27FC236}">
+                <a16:creationId xmlns:a16="http://schemas.microsoft.com/office/drawing/2014/main" id="{B6D2F0FD-A060-4E13-8A32-C3D52050374B}"/>
+              </a:ext>
+            </a:extLst>
+          </p:cNvPr>
+          <p:cNvCxnSpPr>
+            <a:cxnSpLocks/>
+            <a:stCxn id="7" idx="6"/>
+            <a:endCxn id="8" idx="2"/>
+          </p:cNvCxnSpPr>
+          <p:nvPr/>
+        </p:nvCxnSpPr>
+        <p:spPr>
+          <a:xfrm>
+            <a:off x="9089134" y="2093293"/>
+            <a:ext cx="694950" cy="13557"/>
+          </a:xfrm>
+          <a:prstGeom prst="straightConnector1">
+            <a:avLst/>
+          </a:prstGeom>
+          <a:ln w="38100">
+            <a:tailEnd type="triangle"/>
+          </a:ln>
+        </p:spPr>
+        <p:style>
+          <a:lnRef idx="1">
+            <a:schemeClr val="accent1"/>
+          </a:lnRef>
+          <a:fillRef idx="0">
+            <a:schemeClr val="accent1"/>
+          </a:fillRef>
+          <a:effectRef idx="0">
+            <a:schemeClr val="accent1"/>
+          </a:effectRef>
+          <a:fontRef idx="minor">
+            <a:schemeClr val="tx1"/>
+          </a:fontRef>
+        </p:style>
+      </p:cxnSp>
+      <p:sp>
+        <p:nvSpPr>
+          <p:cNvPr id="33" name="TextBox 32">
+            <a:extLst>
+              <a:ext uri="{FF2B5EF4-FFF2-40B4-BE49-F238E27FC236}">
+                <a16:creationId xmlns:a16="http://schemas.microsoft.com/office/drawing/2014/main" id="{2C2784AC-38AB-43C4-B45D-6B79DC9E2BD9}"/>
+              </a:ext>
+            </a:extLst>
+          </p:cNvPr>
+          <p:cNvSpPr txBox="1"/>
+          <p:nvPr/>
+        </p:nvSpPr>
+        <p:spPr>
+          <a:xfrm>
+            <a:off x="298591" y="1021510"/>
+            <a:ext cx="1901952" cy="307777"/>
+          </a:xfrm>
+          <a:prstGeom prst="rect">
+            <a:avLst/>
+          </a:prstGeom>
+          <a:noFill/>
+        </p:spPr>
+        <p:txBody>
+          <a:bodyPr wrap="square" rtlCol="0">
+            <a:spAutoFit/>
+          </a:bodyPr>
+          <a:lstStyle/>
+          <a:p>
+            <a:r>
+              <a:rPr lang="en-US" sz="1400" dirty="0"/>
+              <a:t>Buyer placed an offer</a:t>
+            </a:r>
+          </a:p>
+        </p:txBody>
+      </p:sp>
+      <p:sp>
+        <p:nvSpPr>
+          <p:cNvPr id="34" name="TextBox 33">
+            <a:extLst>
+              <a:ext uri="{FF2B5EF4-FFF2-40B4-BE49-F238E27FC236}">
+                <a16:creationId xmlns:a16="http://schemas.microsoft.com/office/drawing/2014/main" id="{E8A51E09-F248-494D-95DD-28C0395A470D}"/>
+              </a:ext>
+            </a:extLst>
+          </p:cNvPr>
+          <p:cNvSpPr txBox="1"/>
+          <p:nvPr/>
+        </p:nvSpPr>
+        <p:spPr>
+          <a:xfrm>
+            <a:off x="2472634" y="1042330"/>
+            <a:ext cx="1426464" cy="307777"/>
+          </a:xfrm>
+          <a:prstGeom prst="rect">
+            <a:avLst/>
+          </a:prstGeom>
+          <a:noFill/>
+        </p:spPr>
+        <p:txBody>
+          <a:bodyPr wrap="square" rtlCol="0">
+            <a:spAutoFit/>
+          </a:bodyPr>
+          <a:lstStyle/>
+          <a:p>
+            <a:r>
+              <a:rPr lang="en-US" sz="1400" dirty="0"/>
+              <a:t>Seller Accepted</a:t>
+            </a:r>
+          </a:p>
+        </p:txBody>
+      </p:sp>
+      <p:sp>
+        <p:nvSpPr>
+          <p:cNvPr id="35" name="TextBox 34">
+            <a:extLst>
+              <a:ext uri="{FF2B5EF4-FFF2-40B4-BE49-F238E27FC236}">
+                <a16:creationId xmlns:a16="http://schemas.microsoft.com/office/drawing/2014/main" id="{4F90D0AE-2096-47DA-9564-BB01B5748D96}"/>
+              </a:ext>
+            </a:extLst>
+          </p:cNvPr>
+          <p:cNvSpPr txBox="1"/>
+          <p:nvPr/>
+        </p:nvSpPr>
+        <p:spPr>
+          <a:xfrm>
+            <a:off x="4072129" y="81720"/>
+            <a:ext cx="2270759" cy="307777"/>
+          </a:xfrm>
+          <a:prstGeom prst="rect">
+            <a:avLst/>
+          </a:prstGeom>
+          <a:noFill/>
+        </p:spPr>
+        <p:txBody>
+          <a:bodyPr wrap="square" rtlCol="0">
+            <a:spAutoFit/>
+          </a:bodyPr>
+          <a:lstStyle/>
+          <a:p>
+            <a:r>
+              <a:rPr lang="en-US" sz="1400" dirty="0"/>
+              <a:t>Inspector Marked positive</a:t>
+            </a:r>
+          </a:p>
+        </p:txBody>
+      </p:sp>
+      <p:sp>
+        <p:nvSpPr>
+          <p:cNvPr id="36" name="TextBox 35">
+            <a:extLst>
+              <a:ext uri="{FF2B5EF4-FFF2-40B4-BE49-F238E27FC236}">
+                <a16:creationId xmlns:a16="http://schemas.microsoft.com/office/drawing/2014/main" id="{F57EE251-00F6-4AD8-AA68-A685B9E2EF52}"/>
+              </a:ext>
+            </a:extLst>
+          </p:cNvPr>
+          <p:cNvSpPr txBox="1"/>
+          <p:nvPr/>
+        </p:nvSpPr>
+        <p:spPr>
+          <a:xfrm>
+            <a:off x="3691834" y="3142089"/>
+            <a:ext cx="1489766" cy="523220"/>
+          </a:xfrm>
+          <a:prstGeom prst="rect">
+            <a:avLst/>
+          </a:prstGeom>
+          <a:noFill/>
+        </p:spPr>
+        <p:txBody>
+          <a:bodyPr wrap="square" rtlCol="0">
+            <a:spAutoFit/>
+          </a:bodyPr>
+          <a:lstStyle/>
+          <a:p>
+            <a:r>
+              <a:rPr lang="en-US" sz="1400" dirty="0"/>
+              <a:t>Appraiser </a:t>
+            </a:r>
+          </a:p>
+          <a:p>
+            <a:r>
+              <a:rPr lang="en-US" sz="1400" dirty="0"/>
+              <a:t>Marked positive</a:t>
+            </a:r>
+          </a:p>
+        </p:txBody>
+      </p:sp>
+      <p:sp>
+        <p:nvSpPr>
+          <p:cNvPr id="37" name="TextBox 36">
+            <a:extLst>
+              <a:ext uri="{FF2B5EF4-FFF2-40B4-BE49-F238E27FC236}">
+                <a16:creationId xmlns:a16="http://schemas.microsoft.com/office/drawing/2014/main" id="{61562F1A-883A-4B8E-8657-75CEF9E06593}"/>
+              </a:ext>
+            </a:extLst>
+          </p:cNvPr>
+          <p:cNvSpPr txBox="1"/>
+          <p:nvPr/>
+        </p:nvSpPr>
+        <p:spPr>
+          <a:xfrm>
+            <a:off x="7388355" y="879930"/>
+            <a:ext cx="2048254" cy="307777"/>
+          </a:xfrm>
+          <a:prstGeom prst="rect">
+            <a:avLst/>
+          </a:prstGeom>
+          <a:noFill/>
+        </p:spPr>
+        <p:txBody>
+          <a:bodyPr wrap="square" rtlCol="0">
+            <a:spAutoFit/>
+          </a:bodyPr>
+          <a:lstStyle/>
+          <a:p>
+            <a:r>
+              <a:rPr lang="en-US" sz="1400" dirty="0"/>
+              <a:t>Both Parties Accept</a:t>
+            </a:r>
+          </a:p>
+        </p:txBody>
+      </p:sp>
+      <p:sp>
+        <p:nvSpPr>
+          <p:cNvPr id="38" name="TextBox 37">
+            <a:extLst>
+              <a:ext uri="{FF2B5EF4-FFF2-40B4-BE49-F238E27FC236}">
+                <a16:creationId xmlns:a16="http://schemas.microsoft.com/office/drawing/2014/main" id="{920A8E7E-387B-4167-B3B7-5A749EB0F92E}"/>
+              </a:ext>
+            </a:extLst>
+          </p:cNvPr>
+          <p:cNvSpPr txBox="1"/>
+          <p:nvPr/>
+        </p:nvSpPr>
+        <p:spPr>
+          <a:xfrm>
+            <a:off x="9784084" y="3011423"/>
+            <a:ext cx="2298190" cy="307777"/>
+          </a:xfrm>
+          <a:prstGeom prst="rect">
+            <a:avLst/>
+          </a:prstGeom>
+          <a:noFill/>
+        </p:spPr>
+        <p:txBody>
+          <a:bodyPr wrap="square" rtlCol="0">
+            <a:spAutoFit/>
+          </a:bodyPr>
+          <a:lstStyle/>
+          <a:p>
+            <a:r>
+              <a:rPr lang="en-US" sz="1400" dirty="0"/>
+              <a:t>Asset is transferred to buyer</a:t>
+            </a:r>
+          </a:p>
+        </p:txBody>
+      </p:sp>
+      <p:graphicFrame>
+        <p:nvGraphicFramePr>
+          <p:cNvPr id="40" name="Table 39">
+            <a:extLst>
+              <a:ext uri="{FF2B5EF4-FFF2-40B4-BE49-F238E27FC236}">
+                <a16:creationId xmlns:a16="http://schemas.microsoft.com/office/drawing/2014/main" id="{FA2EEAAA-6A3B-4BEE-BCED-D758A1D4153B}"/>
+              </a:ext>
+            </a:extLst>
+          </p:cNvPr>
+          <p:cNvGraphicFramePr>
+            <a:graphicFrameLocks noGrp="1"/>
+          </p:cNvGraphicFramePr>
+          <p:nvPr>
+            <p:extLst>
+              <p:ext uri="{D42A27DB-BD31-4B8C-83A1-F6EECF244321}">
+                <p14:modId xmlns:p14="http://schemas.microsoft.com/office/powerpoint/2010/main" val="730534107"/>
+              </p:ext>
+            </p:extLst>
+          </p:nvPr>
+        </p:nvGraphicFramePr>
+        <p:xfrm>
+          <a:off x="4064000" y="3869993"/>
+          <a:ext cx="8128000" cy="2966720"/>
+        </p:xfrm>
+        <a:graphic>
+          <a:graphicData uri="http://schemas.openxmlformats.org/drawingml/2006/table">
+            <a:tbl>
+              <a:tblPr firstRow="1" bandRow="1">
+                <a:tableStyleId>{2D5ABB26-0587-4C30-8999-92F81FD0307C}</a:tableStyleId>
+              </a:tblPr>
+              <a:tblGrid>
+                <a:gridCol w="2087174">
+                  <a:extLst>
+                    <a:ext uri="{9D8B030D-6E8A-4147-A177-3AD203B41FA5}">
+                      <a16:colId xmlns:a16="http://schemas.microsoft.com/office/drawing/2014/main" val="2764076090"/>
+                    </a:ext>
+                  </a:extLst>
+                </a:gridCol>
+                <a:gridCol w="6040826">
+                  <a:extLst>
+                    <a:ext uri="{9D8B030D-6E8A-4147-A177-3AD203B41FA5}">
+                      <a16:colId xmlns:a16="http://schemas.microsoft.com/office/drawing/2014/main" val="3359725540"/>
+                    </a:ext>
+                  </a:extLst>
+                </a:gridCol>
+              </a:tblGrid>
+              <a:tr h="370840">
+                <a:tc>
+                  <a:txBody>
+                    <a:bodyPr/>
+                    <a:lstStyle/>
+                    <a:p>
+                      <a:r>
+                        <a:rPr lang="en-US" sz="1400" b="1" dirty="0"/>
+                        <a:t>Active</a:t>
+                      </a:r>
+                    </a:p>
+                  </a:txBody>
+                  <a:tcPr>
+                    <a:lnB w="12700" cap="flat" cmpd="sng" algn="ctr">
+                      <a:solidFill>
+                        <a:schemeClr val="tx1"/>
+                      </a:solidFill>
+                      <a:prstDash val="solid"/>
+                      <a:round/>
+                      <a:headEnd type="none" w="med" len="med"/>
+                      <a:tailEnd type="none" w="med" len="med"/>
+                    </a:lnB>
+                  </a:tcPr>
+                </a:tc>
+                <a:tc>
+                  <a:txBody>
+                    <a:bodyPr/>
+                    <a:lstStyle/>
+                    <a:p>
+                      <a:r>
+                        <a:rPr lang="en-US" sz="1400" dirty="0"/>
+                        <a:t>Indicates asset is available for selling/transfer</a:t>
+                      </a:r>
+                    </a:p>
+                  </a:txBody>
+                  <a:tcPr>
+                    <a:lnB w="12700" cap="flat" cmpd="sng" algn="ctr">
+                      <a:solidFill>
+                        <a:schemeClr val="tx1"/>
+                      </a:solidFill>
+                      <a:prstDash val="solid"/>
+                      <a:round/>
+                      <a:headEnd type="none" w="med" len="med"/>
+                      <a:tailEnd type="none" w="med" len="med"/>
+                    </a:lnB>
+                  </a:tcPr>
+                </a:tc>
+                <a:extLst>
+                  <a:ext uri="{0D108BD9-81ED-4DB2-BD59-A6C34878D82A}">
+                    <a16:rowId xmlns:a16="http://schemas.microsoft.com/office/drawing/2014/main" val="3678742131"/>
+                  </a:ext>
+                </a:extLst>
+              </a:tr>
+              <a:tr h="370840">
+                <a:tc>
+                  <a:txBody>
+                    <a:bodyPr/>
+                    <a:lstStyle/>
+                    <a:p>
+                      <a:r>
+                        <a:rPr lang="en-US" sz="1400" b="1" dirty="0"/>
+                        <a:t>Offer Placed</a:t>
+                      </a:r>
+                    </a:p>
+                  </a:txBody>
+                  <a:tcPr>
+                    <a:lnT w="12700" cap="flat" cmpd="sng" algn="ctr">
+                      <a:solidFill>
+                        <a:schemeClr val="tx1"/>
+                      </a:solidFill>
+                      <a:prstDash val="solid"/>
+                      <a:round/>
+                      <a:headEnd type="none" w="med" len="med"/>
+                      <a:tailEnd type="none" w="med" len="med"/>
+                    </a:lnT>
+                    <a:lnB w="12700" cap="flat" cmpd="sng" algn="ctr">
+                      <a:solidFill>
+                        <a:schemeClr val="tx1"/>
+                      </a:solidFill>
+                      <a:prstDash val="solid"/>
+                      <a:round/>
+                      <a:headEnd type="none" w="med" len="med"/>
+                      <a:tailEnd type="none" w="med" len="med"/>
+                    </a:lnB>
+                  </a:tcPr>
+                </a:tc>
+                <a:tc>
+                  <a:txBody>
+                    <a:bodyPr/>
+                    <a:lstStyle/>
+                    <a:p>
+                      <a:r>
+                        <a:rPr lang="en-US" sz="1400" dirty="0"/>
+                        <a:t>Indicates buyer intention to buy</a:t>
+                      </a:r>
+                    </a:p>
+                  </a:txBody>
+                  <a:tcPr>
+                    <a:lnT w="12700" cap="flat" cmpd="sng" algn="ctr">
+                      <a:solidFill>
+                        <a:schemeClr val="tx1"/>
+                      </a:solidFill>
+                      <a:prstDash val="solid"/>
+                      <a:round/>
+                      <a:headEnd type="none" w="med" len="med"/>
+                      <a:tailEnd type="none" w="med" len="med"/>
+                    </a:lnT>
+                    <a:lnB w="12700" cap="flat" cmpd="sng" algn="ctr">
+                      <a:solidFill>
+                        <a:schemeClr val="tx1"/>
+                      </a:solidFill>
+                      <a:prstDash val="solid"/>
+                      <a:round/>
+                      <a:headEnd type="none" w="med" len="med"/>
+                      <a:tailEnd type="none" w="med" len="med"/>
+                    </a:lnB>
+                  </a:tcPr>
+                </a:tc>
+                <a:extLst>
+                  <a:ext uri="{0D108BD9-81ED-4DB2-BD59-A6C34878D82A}">
+                    <a16:rowId xmlns:a16="http://schemas.microsoft.com/office/drawing/2014/main" val="330995737"/>
+                  </a:ext>
+                </a:extLst>
+              </a:tr>
+              <a:tr h="370840">
+                <a:tc>
+                  <a:txBody>
+                    <a:bodyPr/>
+                    <a:lstStyle/>
+                    <a:p>
+                      <a:r>
+                        <a:rPr lang="en-US" sz="1400" b="1" dirty="0"/>
+                        <a:t>Pending Inspection</a:t>
+                      </a:r>
+                    </a:p>
+                  </a:txBody>
+                  <a:tcPr>
+                    <a:lnT w="12700" cap="flat" cmpd="sng" algn="ctr">
+                      <a:solidFill>
+                        <a:schemeClr val="tx1"/>
+                      </a:solidFill>
+                      <a:prstDash val="solid"/>
+                      <a:round/>
+                      <a:headEnd type="none" w="med" len="med"/>
+                      <a:tailEnd type="none" w="med" len="med"/>
+                    </a:lnT>
+                    <a:lnB w="12700" cap="flat" cmpd="sng" algn="ctr">
+                      <a:solidFill>
+                        <a:schemeClr val="tx1"/>
+                      </a:solidFill>
+                      <a:prstDash val="solid"/>
+                      <a:round/>
+                      <a:headEnd type="none" w="med" len="med"/>
+                      <a:tailEnd type="none" w="med" len="med"/>
+                    </a:lnB>
+                  </a:tcPr>
+                </a:tc>
+                <a:tc>
+                  <a:txBody>
+                    <a:bodyPr/>
+                    <a:lstStyle/>
+                    <a:p>
+                      <a:r>
+                        <a:rPr lang="en-US" sz="1400" dirty="0"/>
+                        <a:t>Indicates buyers request to inspector to inspect </a:t>
+                      </a:r>
+                    </a:p>
+                  </a:txBody>
+                  <a:tcPr>
+                    <a:lnT w="12700" cap="flat" cmpd="sng" algn="ctr">
+                      <a:solidFill>
+                        <a:schemeClr val="tx1"/>
+                      </a:solidFill>
+                      <a:prstDash val="solid"/>
+                      <a:round/>
+                      <a:headEnd type="none" w="med" len="med"/>
+                      <a:tailEnd type="none" w="med" len="med"/>
+                    </a:lnT>
+                    <a:lnB w="12700" cap="flat" cmpd="sng" algn="ctr">
+                      <a:solidFill>
+                        <a:schemeClr val="tx1"/>
+                      </a:solidFill>
+                      <a:prstDash val="solid"/>
+                      <a:round/>
+                      <a:headEnd type="none" w="med" len="med"/>
+                      <a:tailEnd type="none" w="med" len="med"/>
+                    </a:lnB>
+                  </a:tcPr>
+                </a:tc>
+                <a:extLst>
+                  <a:ext uri="{0D108BD9-81ED-4DB2-BD59-A6C34878D82A}">
+                    <a16:rowId xmlns:a16="http://schemas.microsoft.com/office/drawing/2014/main" val="2578167685"/>
+                  </a:ext>
+                </a:extLst>
+              </a:tr>
+              <a:tr h="370840">
+                <a:tc>
+                  <a:txBody>
+                    <a:bodyPr/>
+                    <a:lstStyle/>
+                    <a:p>
+                      <a:r>
+                        <a:rPr lang="en-US" sz="1400" b="1" dirty="0"/>
+                        <a:t>Inspected</a:t>
+                      </a:r>
+                    </a:p>
+                  </a:txBody>
+                  <a:tcPr>
+                    <a:lnT w="12700" cap="flat" cmpd="sng" algn="ctr">
+                      <a:solidFill>
+                        <a:schemeClr val="tx1"/>
+                      </a:solidFill>
+                      <a:prstDash val="solid"/>
+                      <a:round/>
+                      <a:headEnd type="none" w="med" len="med"/>
+                      <a:tailEnd type="none" w="med" len="med"/>
+                    </a:lnT>
+                    <a:lnB w="12700" cap="flat" cmpd="sng" algn="ctr">
+                      <a:solidFill>
+                        <a:schemeClr val="tx1"/>
+                      </a:solidFill>
+                      <a:prstDash val="solid"/>
+                      <a:round/>
+                      <a:headEnd type="none" w="med" len="med"/>
+                      <a:tailEnd type="none" w="med" len="med"/>
+                    </a:lnB>
+                  </a:tcPr>
+                </a:tc>
+                <a:tc>
+                  <a:txBody>
+                    <a:bodyPr/>
+                    <a:lstStyle/>
+                    <a:p>
+                      <a:r>
+                        <a:rPr lang="en-US" sz="1400" dirty="0"/>
+                        <a:t>Indicates Inspectors approval to buy the asset under consideration</a:t>
+                      </a:r>
+                    </a:p>
+                  </a:txBody>
+                  <a:tcPr>
+                    <a:lnT w="12700" cap="flat" cmpd="sng" algn="ctr">
+                      <a:solidFill>
+                        <a:schemeClr val="tx1"/>
+                      </a:solidFill>
+                      <a:prstDash val="solid"/>
+                      <a:round/>
+                      <a:headEnd type="none" w="med" len="med"/>
+                      <a:tailEnd type="none" w="med" len="med"/>
+                    </a:lnT>
+                    <a:lnB w="12700" cap="flat" cmpd="sng" algn="ctr">
+                      <a:solidFill>
+                        <a:schemeClr val="tx1"/>
+                      </a:solidFill>
+                      <a:prstDash val="solid"/>
+                      <a:round/>
+                      <a:headEnd type="none" w="med" len="med"/>
+                      <a:tailEnd type="none" w="med" len="med"/>
+                    </a:lnB>
+                  </a:tcPr>
+                </a:tc>
+                <a:extLst>
+                  <a:ext uri="{0D108BD9-81ED-4DB2-BD59-A6C34878D82A}">
+                    <a16:rowId xmlns:a16="http://schemas.microsoft.com/office/drawing/2014/main" val="2403961085"/>
+                  </a:ext>
+                </a:extLst>
+              </a:tr>
+              <a:tr h="370840">
+                <a:tc>
+                  <a:txBody>
+                    <a:bodyPr/>
+                    <a:lstStyle/>
+                    <a:p>
+                      <a:r>
+                        <a:rPr lang="en-US" sz="1400" b="1" dirty="0"/>
+                        <a:t>Appraised</a:t>
+                      </a:r>
+                    </a:p>
+                  </a:txBody>
+                  <a:tcPr>
+                    <a:lnT w="12700" cap="flat" cmpd="sng" algn="ctr">
+                      <a:solidFill>
+                        <a:schemeClr val="tx1"/>
+                      </a:solidFill>
+                      <a:prstDash val="solid"/>
+                      <a:round/>
+                      <a:headEnd type="none" w="med" len="med"/>
+                      <a:tailEnd type="none" w="med" len="med"/>
+                    </a:lnT>
+                    <a:lnB w="12700" cap="flat" cmpd="sng" algn="ctr">
+                      <a:solidFill>
+                        <a:schemeClr val="tx1"/>
+                      </a:solidFill>
+                      <a:prstDash val="solid"/>
+                      <a:round/>
+                      <a:headEnd type="none" w="med" len="med"/>
+                      <a:tailEnd type="none" w="med" len="med"/>
+                    </a:lnB>
+                  </a:tcPr>
+                </a:tc>
+                <a:tc>
+                  <a:txBody>
+                    <a:bodyPr/>
+                    <a:lstStyle/>
+                    <a:p>
+                      <a:r>
+                        <a:rPr lang="en-US" sz="1400" dirty="0"/>
+                        <a:t>Indicates Appraisal approval</a:t>
+                      </a:r>
+                    </a:p>
+                  </a:txBody>
+                  <a:tcPr>
+                    <a:lnT w="12700" cap="flat" cmpd="sng" algn="ctr">
+                      <a:solidFill>
+                        <a:schemeClr val="tx1"/>
+                      </a:solidFill>
+                      <a:prstDash val="solid"/>
+                      <a:round/>
+                      <a:headEnd type="none" w="med" len="med"/>
+                      <a:tailEnd type="none" w="med" len="med"/>
+                    </a:lnT>
+                    <a:lnB w="12700" cap="flat" cmpd="sng" algn="ctr">
+                      <a:solidFill>
+                        <a:schemeClr val="tx1"/>
+                      </a:solidFill>
+                      <a:prstDash val="solid"/>
+                      <a:round/>
+                      <a:headEnd type="none" w="med" len="med"/>
+                      <a:tailEnd type="none" w="med" len="med"/>
+                    </a:lnB>
+                  </a:tcPr>
+                </a:tc>
+                <a:extLst>
+                  <a:ext uri="{0D108BD9-81ED-4DB2-BD59-A6C34878D82A}">
+                    <a16:rowId xmlns:a16="http://schemas.microsoft.com/office/drawing/2014/main" val="3415009234"/>
+                  </a:ext>
+                </a:extLst>
+              </a:tr>
+              <a:tr h="370840">
+                <a:tc>
+                  <a:txBody>
+                    <a:bodyPr/>
+                    <a:lstStyle/>
+                    <a:p>
+                      <a:r>
+                        <a:rPr lang="en-US" sz="1400" b="1" dirty="0"/>
+                        <a:t>Seller Accepted</a:t>
+                      </a:r>
+                    </a:p>
+                  </a:txBody>
+                  <a:tcPr>
+                    <a:lnT w="12700" cap="flat" cmpd="sng" algn="ctr">
+                      <a:solidFill>
+                        <a:schemeClr val="tx1"/>
+                      </a:solidFill>
+                      <a:prstDash val="solid"/>
+                      <a:round/>
+                      <a:headEnd type="none" w="med" len="med"/>
+                      <a:tailEnd type="none" w="med" len="med"/>
+                    </a:lnT>
+                    <a:lnB w="12700" cap="flat" cmpd="sng" algn="ctr">
+                      <a:solidFill>
+                        <a:schemeClr val="tx1"/>
+                      </a:solidFill>
+                      <a:prstDash val="solid"/>
+                      <a:round/>
+                      <a:headEnd type="none" w="med" len="med"/>
+                      <a:tailEnd type="none" w="med" len="med"/>
+                    </a:lnB>
+                  </a:tcPr>
+                </a:tc>
+                <a:tc>
+                  <a:txBody>
+                    <a:bodyPr/>
+                    <a:lstStyle/>
+                    <a:p>
+                      <a:r>
+                        <a:rPr lang="en-US" sz="1400" dirty="0"/>
+                        <a:t>Indicates Owner’s approval</a:t>
+                      </a:r>
+                    </a:p>
+                  </a:txBody>
+                  <a:tcPr>
+                    <a:lnT w="12700" cap="flat" cmpd="sng" algn="ctr">
+                      <a:solidFill>
+                        <a:schemeClr val="tx1"/>
+                      </a:solidFill>
+                      <a:prstDash val="solid"/>
+                      <a:round/>
+                      <a:headEnd type="none" w="med" len="med"/>
+                      <a:tailEnd type="none" w="med" len="med"/>
+                    </a:lnT>
+                    <a:lnB w="12700" cap="flat" cmpd="sng" algn="ctr">
+                      <a:solidFill>
+                        <a:schemeClr val="tx1"/>
+                      </a:solidFill>
+                      <a:prstDash val="solid"/>
+                      <a:round/>
+                      <a:headEnd type="none" w="med" len="med"/>
+                      <a:tailEnd type="none" w="med" len="med"/>
+                    </a:lnB>
+                  </a:tcPr>
+                </a:tc>
+                <a:extLst>
+                  <a:ext uri="{0D108BD9-81ED-4DB2-BD59-A6C34878D82A}">
+                    <a16:rowId xmlns:a16="http://schemas.microsoft.com/office/drawing/2014/main" val="1308999662"/>
+                  </a:ext>
+                </a:extLst>
+              </a:tr>
+              <a:tr h="370840">
+                <a:tc>
+                  <a:txBody>
+                    <a:bodyPr/>
+                    <a:lstStyle/>
+                    <a:p>
+                      <a:r>
+                        <a:rPr lang="en-US" sz="1400" b="1" dirty="0"/>
+                        <a:t>Buyer Accepted</a:t>
+                      </a:r>
+                    </a:p>
+                  </a:txBody>
+                  <a:tcPr>
+                    <a:lnT w="12700" cap="flat" cmpd="sng" algn="ctr">
+                      <a:solidFill>
+                        <a:schemeClr val="tx1"/>
+                      </a:solidFill>
+                      <a:prstDash val="solid"/>
+                      <a:round/>
+                      <a:headEnd type="none" w="med" len="med"/>
+                      <a:tailEnd type="none" w="med" len="med"/>
+                    </a:lnT>
+                    <a:lnB w="12700" cap="flat" cmpd="sng" algn="ctr">
+                      <a:solidFill>
+                        <a:schemeClr val="tx1"/>
+                      </a:solidFill>
+                      <a:prstDash val="solid"/>
+                      <a:round/>
+                      <a:headEnd type="none" w="med" len="med"/>
+                      <a:tailEnd type="none" w="med" len="med"/>
+                    </a:lnB>
+                  </a:tcPr>
+                </a:tc>
+                <a:tc>
+                  <a:txBody>
+                    <a:bodyPr/>
+                    <a:lstStyle/>
+                    <a:p>
+                      <a:r>
+                        <a:rPr lang="en-US" sz="1400" dirty="0"/>
+                        <a:t>Indicates Buyer’s approval</a:t>
+                      </a:r>
+                    </a:p>
+                  </a:txBody>
+                  <a:tcPr>
+                    <a:lnT w="12700" cap="flat" cmpd="sng" algn="ctr">
+                      <a:solidFill>
+                        <a:schemeClr val="tx1"/>
+                      </a:solidFill>
+                      <a:prstDash val="solid"/>
+                      <a:round/>
+                      <a:headEnd type="none" w="med" len="med"/>
+                      <a:tailEnd type="none" w="med" len="med"/>
+                    </a:lnT>
+                    <a:lnB w="12700" cap="flat" cmpd="sng" algn="ctr">
+                      <a:solidFill>
+                        <a:schemeClr val="tx1"/>
+                      </a:solidFill>
+                      <a:prstDash val="solid"/>
+                      <a:round/>
+                      <a:headEnd type="none" w="med" len="med"/>
+                      <a:tailEnd type="none" w="med" len="med"/>
+                    </a:lnB>
+                  </a:tcPr>
+                </a:tc>
+                <a:extLst>
+                  <a:ext uri="{0D108BD9-81ED-4DB2-BD59-A6C34878D82A}">
+                    <a16:rowId xmlns:a16="http://schemas.microsoft.com/office/drawing/2014/main" val="3170892852"/>
+                  </a:ext>
+                </a:extLst>
+              </a:tr>
+              <a:tr h="370840">
+                <a:tc>
+                  <a:txBody>
+                    <a:bodyPr/>
+                    <a:lstStyle/>
+                    <a:p>
+                      <a:r>
+                        <a:rPr lang="en-US" sz="1400" b="1" dirty="0"/>
+                        <a:t>Accepted</a:t>
+                      </a:r>
+                    </a:p>
+                  </a:txBody>
+                  <a:tcPr>
+                    <a:lnT w="12700" cap="flat" cmpd="sng" algn="ctr">
+                      <a:solidFill>
+                        <a:schemeClr val="tx1"/>
+                      </a:solidFill>
+                      <a:prstDash val="solid"/>
+                      <a:round/>
+                      <a:headEnd type="none" w="med" len="med"/>
+                      <a:tailEnd type="none" w="med" len="med"/>
+                    </a:lnT>
+                  </a:tcPr>
+                </a:tc>
+                <a:tc>
+                  <a:txBody>
+                    <a:bodyPr/>
+                    <a:lstStyle/>
+                    <a:p>
+                      <a:r>
+                        <a:rPr lang="en-US" sz="1400" dirty="0"/>
+                        <a:t>Indicates both buyer and seller have agreed to the transfer.</a:t>
+                      </a:r>
+                    </a:p>
+                  </a:txBody>
+                  <a:tcPr>
+                    <a:lnT w="12700" cap="flat" cmpd="sng" algn="ctr">
+                      <a:solidFill>
+                        <a:schemeClr val="tx1"/>
+                      </a:solidFill>
+                      <a:prstDash val="solid"/>
+                      <a:round/>
+                      <a:headEnd type="none" w="med" len="med"/>
+                      <a:tailEnd type="none" w="med" len="med"/>
+                    </a:lnT>
+                  </a:tcPr>
+                </a:tc>
+                <a:extLst>
+                  <a:ext uri="{0D108BD9-81ED-4DB2-BD59-A6C34878D82A}">
+                    <a16:rowId xmlns:a16="http://schemas.microsoft.com/office/drawing/2014/main" val="1386723900"/>
+                  </a:ext>
+                </a:extLst>
+              </a:tr>
+            </a:tbl>
+          </a:graphicData>
+        </a:graphic>
+      </p:graphicFrame>
+    </p:spTree>
+    <p:extLst>
+      <p:ext uri="{BB962C8B-B14F-4D97-AF65-F5344CB8AC3E}">
+        <p14:creationId xmlns:p14="http://schemas.microsoft.com/office/powerpoint/2010/main" val="2049564605"/>
+      </p:ext>
+    </p:extLst>
+  </p:cSld>
+  <p:clrMapOvr>
+    <a:masterClrMapping/>
+  </p:clrMapOvr>
+</p:sld>
+</file>
+
 <file path=ppt/slides/slide2.xml><?xml version="1.0" encoding="utf-8"?>
 <p:sld xmlns:a="http://schemas.openxmlformats.org/drawingml/2006/main" xmlns:r="http://schemas.openxmlformats.org/officeDocument/2006/relationships" xmlns:p="http://schemas.openxmlformats.org/presentationml/2006/main">
   <p:cSld>
@@ -8427,7 +10687,7 @@
             <a:pPr algn="just"/>
             <a:r>
               <a:rPr lang="en-US" sz="2800" dirty="0"/>
-              <a:t>Code walk through</a:t>
+              <a:t>Code (API’s)</a:t>
             </a:r>
           </a:p>
         </p:txBody>
@@ -9331,8 +11591,8 @@
         </p:nvSpPr>
         <p:spPr>
           <a:xfrm>
-            <a:off x="252983" y="2133335"/>
-            <a:ext cx="6946469" cy="3970476"/>
+            <a:off x="252983" y="1913878"/>
+            <a:ext cx="6946469" cy="4486921"/>
           </a:xfrm>
         </p:spPr>
         <p:txBody>
@@ -9381,12 +11641,24 @@
             <a:pPr algn="just"/>
             <a:r>
               <a:rPr lang="en-US" sz="2000" dirty="0"/>
-              <a:t>Works on an ‘If-Then’ principle</a:t>
-            </a:r>
-          </a:p>
-          <a:p>
-            <a:pPr algn="just"/>
-            <a:endParaRPr lang="en-US" sz="2000" dirty="0"/>
+              <a:t>Works on the principle of the IFTTT logic aka the </a:t>
+            </a:r>
+            <a:r>
+              <a:rPr lang="en-US" sz="2000" dirty="0">
+                <a:hlinkClick r:id="rId2">
+                  <a:extLst>
+                    <a:ext uri="{A12FA001-AC4F-418D-AE19-62706E023703}">
+                      <ahyp:hlinkClr xmlns:ahyp="http://schemas.microsoft.com/office/drawing/2018/hyperlinkcolor" val="tx"/>
+                    </a:ext>
+                  </a:extLst>
+                </a:hlinkClick>
+              </a:rPr>
+              <a:t>IF-THIS-THEN-THAT logic</a:t>
+            </a:r>
+            <a:r>
+              <a:rPr lang="en-US" sz="2000" dirty="0"/>
+              <a:t>. Basically, if the first set of instructions are done then execute the next function and after that the next until you reach the end of the contract.</a:t>
+            </a:r>
           </a:p>
           <a:p>
             <a:pPr algn="just"/>
@@ -9409,7 +11681,7 @@
           <p:nvPr/>
         </p:nvPicPr>
         <p:blipFill>
-          <a:blip r:embed="rId2" cstate="print">
+          <a:blip r:embed="rId3" cstate="print">
             <a:extLst>
               <a:ext uri="{28A0092B-C50C-407E-A947-70E740481C1C}">
                 <a14:useLocalDpi xmlns:a14="http://schemas.microsoft.com/office/drawing/2010/main" val="0"/>
@@ -9473,6 +11745,609 @@
       </p:grpSpPr>
       <p:sp>
         <p:nvSpPr>
+          <p:cNvPr id="7" name="Rectangle 6">
+            <a:extLst>
+              <a:ext uri="{FF2B5EF4-FFF2-40B4-BE49-F238E27FC236}">
+                <a16:creationId xmlns:a16="http://schemas.microsoft.com/office/drawing/2014/main" id="{02A245AD-4595-4AED-9F58-50AFA566F429}"/>
+              </a:ext>
+            </a:extLst>
+          </p:cNvPr>
+          <p:cNvSpPr/>
+          <p:nvPr/>
+        </p:nvSpPr>
+        <p:spPr>
+          <a:xfrm>
+            <a:off x="256032" y="2084832"/>
+            <a:ext cx="5462016" cy="1709927"/>
+          </a:xfrm>
+          <a:prstGeom prst="rect">
+            <a:avLst/>
+          </a:prstGeom>
+        </p:spPr>
+        <p:style>
+          <a:lnRef idx="2">
+            <a:schemeClr val="accent1">
+              <a:shade val="50000"/>
+            </a:schemeClr>
+          </a:lnRef>
+          <a:fillRef idx="1">
+            <a:schemeClr val="accent1"/>
+          </a:fillRef>
+          <a:effectRef idx="0">
+            <a:schemeClr val="accent1"/>
+          </a:effectRef>
+          <a:fontRef idx="minor">
+            <a:schemeClr val="lt1"/>
+          </a:fontRef>
+        </p:style>
+        <p:txBody>
+          <a:bodyPr rtlCol="0" anchor="ctr"/>
+          <a:lstStyle/>
+          <a:p>
+            <a:pPr algn="ctr"/>
+            <a:endParaRPr lang="en-US"/>
+          </a:p>
+        </p:txBody>
+      </p:sp>
+      <p:sp>
+        <p:nvSpPr>
+          <p:cNvPr id="3" name="Title 2">
+            <a:extLst>
+              <a:ext uri="{FF2B5EF4-FFF2-40B4-BE49-F238E27FC236}">
+                <a16:creationId xmlns:a16="http://schemas.microsoft.com/office/drawing/2014/main" id="{F29CA3E4-23AC-4378-B05B-C160D84E479C}"/>
+              </a:ext>
+            </a:extLst>
+          </p:cNvPr>
+          <p:cNvSpPr>
+            <a:spLocks noGrp="1"/>
+          </p:cNvSpPr>
+          <p:nvPr>
+            <p:ph type="title"/>
+          </p:nvPr>
+        </p:nvSpPr>
+        <p:spPr/>
+        <p:txBody>
+          <a:bodyPr>
+            <a:normAutofit fontScale="90000"/>
+          </a:bodyPr>
+          <a:lstStyle/>
+          <a:p>
+            <a:r>
+              <a:rPr lang="en-US" dirty="0"/>
+              <a:t>Smart Contract Platforms </a:t>
+            </a:r>
+            <a:br>
+              <a:rPr lang="en-US" dirty="0"/>
+            </a:br>
+            <a:r>
+              <a:rPr lang="en-US" dirty="0"/>
+              <a:t>OPTIONS</a:t>
+            </a:r>
+          </a:p>
+        </p:txBody>
+      </p:sp>
+      <p:sp>
+        <p:nvSpPr>
+          <p:cNvPr id="5" name="Content Placeholder 2">
+            <a:extLst>
+              <a:ext uri="{FF2B5EF4-FFF2-40B4-BE49-F238E27FC236}">
+                <a16:creationId xmlns:a16="http://schemas.microsoft.com/office/drawing/2014/main" id="{CDE4E3DB-DA17-4EF4-9277-4E5D53532941}"/>
+              </a:ext>
+            </a:extLst>
+          </p:cNvPr>
+          <p:cNvSpPr>
+            <a:spLocks noGrp="1"/>
+          </p:cNvSpPr>
+          <p:nvPr>
+            <p:ph idx="1"/>
+          </p:nvPr>
+        </p:nvSpPr>
+        <p:spPr>
+          <a:xfrm>
+            <a:off x="649223" y="385248"/>
+            <a:ext cx="11731753" cy="926857"/>
+          </a:xfrm>
+        </p:spPr>
+        <p:txBody>
+          <a:bodyPr>
+            <a:noAutofit/>
+          </a:bodyPr>
+          <a:lstStyle/>
+          <a:p>
+            <a:pPr algn="just"/>
+            <a:r>
+              <a:rPr lang="en-US" sz="2000" b="1" dirty="0"/>
+              <a:t>Ethereum</a:t>
+            </a:r>
+            <a:r>
+              <a:rPr lang="en-US" sz="2000" dirty="0"/>
+              <a:t> - </a:t>
+            </a:r>
+            <a:r>
+              <a:rPr lang="en-US" sz="2000" b="1" dirty="0" err="1"/>
+              <a:t>Stratis</a:t>
+            </a:r>
+            <a:r>
+              <a:rPr lang="en-US" sz="2000" dirty="0"/>
+              <a:t> – </a:t>
+            </a:r>
+          </a:p>
+          <a:p>
+            <a:pPr algn="just"/>
+            <a:endParaRPr lang="en-US" sz="2000" dirty="0"/>
+          </a:p>
+          <a:p>
+            <a:pPr algn="just"/>
+            <a:endParaRPr lang="en-US" sz="2000" dirty="0"/>
+          </a:p>
+        </p:txBody>
+      </p:sp>
+      <p:pic>
+        <p:nvPicPr>
+          <p:cNvPr id="1026" name="Picture 2" descr="Image result for quorum blockchain logo">
+            <a:extLst>
+              <a:ext uri="{FF2B5EF4-FFF2-40B4-BE49-F238E27FC236}">
+                <a16:creationId xmlns:a16="http://schemas.microsoft.com/office/drawing/2014/main" id="{3F714D0B-A332-45EF-A850-CF8106F4166C}"/>
+              </a:ext>
+            </a:extLst>
+          </p:cNvPr>
+          <p:cNvPicPr>
+            <a:picLocks noChangeAspect="1" noChangeArrowheads="1"/>
+          </p:cNvPicPr>
+          <p:nvPr/>
+        </p:nvPicPr>
+        <p:blipFill>
+          <a:blip r:embed="rId3">
+            <a:extLst>
+              <a:ext uri="{28A0092B-C50C-407E-A947-70E740481C1C}">
+                <a14:useLocalDpi xmlns:a14="http://schemas.microsoft.com/office/drawing/2010/main" val="0"/>
+              </a:ext>
+            </a:extLst>
+          </a:blip>
+          <a:srcRect/>
+          <a:stretch>
+            <a:fillRect/>
+          </a:stretch>
+        </p:blipFill>
+        <p:spPr bwMode="auto">
+          <a:xfrm>
+            <a:off x="256032" y="2079800"/>
+            <a:ext cx="1709927" cy="1709927"/>
+          </a:xfrm>
+          <a:prstGeom prst="rect">
+            <a:avLst/>
+          </a:prstGeom>
+          <a:noFill/>
+          <a:ln>
+            <a:solidFill>
+              <a:schemeClr val="tx1"/>
+            </a:solidFill>
+          </a:ln>
+          <a:extLst>
+            <a:ext uri="{909E8E84-426E-40DD-AFC4-6F175D3DCCD1}">
+              <a14:hiddenFill xmlns:a14="http://schemas.microsoft.com/office/drawing/2010/main">
+                <a:solidFill>
+                  <a:srgbClr val="FFFFFF"/>
+                </a:solidFill>
+              </a14:hiddenFill>
+            </a:ext>
+          </a:extLst>
+        </p:spPr>
+      </p:pic>
+      <p:sp>
+        <p:nvSpPr>
+          <p:cNvPr id="6" name="Rectangle 5">
+            <a:extLst>
+              <a:ext uri="{FF2B5EF4-FFF2-40B4-BE49-F238E27FC236}">
+                <a16:creationId xmlns:a16="http://schemas.microsoft.com/office/drawing/2014/main" id="{44C74AED-4A82-4507-A915-9FB4BC38E77F}"/>
+              </a:ext>
+            </a:extLst>
+          </p:cNvPr>
+          <p:cNvSpPr/>
+          <p:nvPr/>
+        </p:nvSpPr>
+        <p:spPr>
+          <a:xfrm>
+            <a:off x="2025395" y="2103703"/>
+            <a:ext cx="3633216" cy="1200329"/>
+          </a:xfrm>
+          <a:prstGeom prst="rect">
+            <a:avLst/>
+          </a:prstGeom>
+        </p:spPr>
+        <p:txBody>
+          <a:bodyPr wrap="square">
+            <a:spAutoFit/>
+          </a:bodyPr>
+          <a:lstStyle/>
+          <a:p>
+            <a:pPr algn="just"/>
+            <a:r>
+              <a:rPr lang="en-US" b="1" dirty="0">
+                <a:solidFill>
+                  <a:schemeClr val="bg1"/>
+                </a:solidFill>
+              </a:rPr>
+              <a:t>Quorum</a:t>
+            </a:r>
+            <a:r>
+              <a:rPr lang="en-US" dirty="0">
+                <a:solidFill>
+                  <a:schemeClr val="bg1"/>
+                </a:solidFill>
+              </a:rPr>
+              <a:t> – Fork of Ethereum, enterprise focused version of Ethereum. Backed by JP Morgan chase.  </a:t>
+            </a:r>
+          </a:p>
+        </p:txBody>
+      </p:sp>
+      <p:sp>
+        <p:nvSpPr>
+          <p:cNvPr id="9" name="Rectangle 8">
+            <a:extLst>
+              <a:ext uri="{FF2B5EF4-FFF2-40B4-BE49-F238E27FC236}">
+                <a16:creationId xmlns:a16="http://schemas.microsoft.com/office/drawing/2014/main" id="{CF8E8C4D-0614-435F-82F0-F324B879838A}"/>
+              </a:ext>
+            </a:extLst>
+          </p:cNvPr>
+          <p:cNvSpPr/>
+          <p:nvPr/>
+        </p:nvSpPr>
+        <p:spPr>
+          <a:xfrm>
+            <a:off x="6187440" y="2084832"/>
+            <a:ext cx="5541264" cy="1709927"/>
+          </a:xfrm>
+          <a:prstGeom prst="rect">
+            <a:avLst/>
+          </a:prstGeom>
+        </p:spPr>
+        <p:style>
+          <a:lnRef idx="2">
+            <a:schemeClr val="accent1">
+              <a:shade val="50000"/>
+            </a:schemeClr>
+          </a:lnRef>
+          <a:fillRef idx="1">
+            <a:schemeClr val="accent1"/>
+          </a:fillRef>
+          <a:effectRef idx="0">
+            <a:schemeClr val="accent1"/>
+          </a:effectRef>
+          <a:fontRef idx="minor">
+            <a:schemeClr val="lt1"/>
+          </a:fontRef>
+        </p:style>
+        <p:txBody>
+          <a:bodyPr rtlCol="0" anchor="ctr"/>
+          <a:lstStyle/>
+          <a:p>
+            <a:pPr algn="ctr"/>
+            <a:endParaRPr lang="en-US"/>
+          </a:p>
+        </p:txBody>
+      </p:sp>
+      <p:sp>
+        <p:nvSpPr>
+          <p:cNvPr id="11" name="Rectangle 10">
+            <a:extLst>
+              <a:ext uri="{FF2B5EF4-FFF2-40B4-BE49-F238E27FC236}">
+                <a16:creationId xmlns:a16="http://schemas.microsoft.com/office/drawing/2014/main" id="{5DF9EE21-4924-497C-BE4B-93F7B7E4765F}"/>
+              </a:ext>
+            </a:extLst>
+          </p:cNvPr>
+          <p:cNvSpPr/>
+          <p:nvPr/>
+        </p:nvSpPr>
+        <p:spPr>
+          <a:xfrm>
+            <a:off x="8205173" y="2103703"/>
+            <a:ext cx="3523531" cy="1754326"/>
+          </a:xfrm>
+          <a:prstGeom prst="rect">
+            <a:avLst/>
+          </a:prstGeom>
+        </p:spPr>
+        <p:txBody>
+          <a:bodyPr wrap="square">
+            <a:spAutoFit/>
+          </a:bodyPr>
+          <a:lstStyle/>
+          <a:p>
+            <a:pPr algn="just"/>
+            <a:r>
+              <a:rPr lang="en-US" b="1" dirty="0">
+                <a:solidFill>
+                  <a:schemeClr val="bg1"/>
+                </a:solidFill>
+              </a:rPr>
+              <a:t>Quorum</a:t>
+            </a:r>
+            <a:r>
+              <a:rPr lang="en-US" dirty="0">
+                <a:solidFill>
+                  <a:schemeClr val="bg1"/>
+                </a:solidFill>
+              </a:rPr>
+              <a:t> – More inclined towards C# and .NET ecosystem, you can write smart contracts in C#. In very early stages not that mature.</a:t>
+            </a:r>
+          </a:p>
+          <a:p>
+            <a:pPr algn="just"/>
+            <a:endParaRPr lang="en-US" dirty="0"/>
+          </a:p>
+          <a:p>
+            <a:pPr algn="just"/>
+            <a:endParaRPr lang="en-US" dirty="0">
+              <a:solidFill>
+                <a:schemeClr val="bg1"/>
+              </a:solidFill>
+            </a:endParaRPr>
+          </a:p>
+        </p:txBody>
+      </p:sp>
+      <p:pic>
+        <p:nvPicPr>
+          <p:cNvPr id="1030" name="Picture 6" descr="Image result for Stratis C# blockchain">
+            <a:extLst>
+              <a:ext uri="{FF2B5EF4-FFF2-40B4-BE49-F238E27FC236}">
+                <a16:creationId xmlns:a16="http://schemas.microsoft.com/office/drawing/2014/main" id="{BEA23515-3CDD-464E-B0B9-03F349FF2FF0}"/>
+              </a:ext>
+            </a:extLst>
+          </p:cNvPr>
+          <p:cNvPicPr>
+            <a:picLocks noChangeAspect="1" noChangeArrowheads="1"/>
+          </p:cNvPicPr>
+          <p:nvPr/>
+        </p:nvPicPr>
+        <p:blipFill>
+          <a:blip r:embed="rId4" cstate="print">
+            <a:extLst>
+              <a:ext uri="{28A0092B-C50C-407E-A947-70E740481C1C}">
+                <a14:useLocalDpi xmlns:a14="http://schemas.microsoft.com/office/drawing/2010/main" val="0"/>
+              </a:ext>
+            </a:extLst>
+          </a:blip>
+          <a:srcRect/>
+          <a:stretch>
+            <a:fillRect/>
+          </a:stretch>
+        </p:blipFill>
+        <p:spPr bwMode="auto">
+          <a:xfrm>
+            <a:off x="6187440" y="2121407"/>
+            <a:ext cx="2029968" cy="1668319"/>
+          </a:xfrm>
+          <a:prstGeom prst="rect">
+            <a:avLst/>
+          </a:prstGeom>
+          <a:noFill/>
+          <a:extLst>
+            <a:ext uri="{909E8E84-426E-40DD-AFC4-6F175D3DCCD1}">
+              <a14:hiddenFill xmlns:a14="http://schemas.microsoft.com/office/drawing/2010/main">
+                <a:solidFill>
+                  <a:srgbClr val="FFFFFF"/>
+                </a:solidFill>
+              </a14:hiddenFill>
+            </a:ext>
+          </a:extLst>
+        </p:spPr>
+      </p:pic>
+      <p:sp>
+        <p:nvSpPr>
+          <p:cNvPr id="14" name="Rectangle 13">
+            <a:extLst>
+              <a:ext uri="{FF2B5EF4-FFF2-40B4-BE49-F238E27FC236}">
+                <a16:creationId xmlns:a16="http://schemas.microsoft.com/office/drawing/2014/main" id="{511C7E8B-5F83-4705-A292-CC42EA663DBC}"/>
+              </a:ext>
+            </a:extLst>
+          </p:cNvPr>
+          <p:cNvSpPr/>
+          <p:nvPr/>
+        </p:nvSpPr>
+        <p:spPr>
+          <a:xfrm>
+            <a:off x="256032" y="4273296"/>
+            <a:ext cx="5462016" cy="1709927"/>
+          </a:xfrm>
+          <a:prstGeom prst="rect">
+            <a:avLst/>
+          </a:prstGeom>
+        </p:spPr>
+        <p:style>
+          <a:lnRef idx="2">
+            <a:schemeClr val="accent1">
+              <a:shade val="50000"/>
+            </a:schemeClr>
+          </a:lnRef>
+          <a:fillRef idx="1">
+            <a:schemeClr val="accent1"/>
+          </a:fillRef>
+          <a:effectRef idx="0">
+            <a:schemeClr val="accent1"/>
+          </a:effectRef>
+          <a:fontRef idx="minor">
+            <a:schemeClr val="lt1"/>
+          </a:fontRef>
+        </p:style>
+        <p:txBody>
+          <a:bodyPr rtlCol="0" anchor="ctr"/>
+          <a:lstStyle/>
+          <a:p>
+            <a:pPr algn="ctr"/>
+            <a:endParaRPr lang="en-US"/>
+          </a:p>
+        </p:txBody>
+      </p:sp>
+      <p:sp>
+        <p:nvSpPr>
+          <p:cNvPr id="16" name="Rectangle 15">
+            <a:extLst>
+              <a:ext uri="{FF2B5EF4-FFF2-40B4-BE49-F238E27FC236}">
+                <a16:creationId xmlns:a16="http://schemas.microsoft.com/office/drawing/2014/main" id="{1A478BE3-EACD-47DF-8FD4-A2A742B57E36}"/>
+              </a:ext>
+            </a:extLst>
+          </p:cNvPr>
+          <p:cNvSpPr/>
+          <p:nvPr/>
+        </p:nvSpPr>
+        <p:spPr>
+          <a:xfrm>
+            <a:off x="2121407" y="4292167"/>
+            <a:ext cx="3537203" cy="923330"/>
+          </a:xfrm>
+          <a:prstGeom prst="rect">
+            <a:avLst/>
+          </a:prstGeom>
+        </p:spPr>
+        <p:txBody>
+          <a:bodyPr wrap="square">
+            <a:spAutoFit/>
+          </a:bodyPr>
+          <a:lstStyle/>
+          <a:p>
+            <a:pPr algn="just"/>
+            <a:r>
+              <a:rPr lang="en-US" dirty="0">
+                <a:solidFill>
+                  <a:schemeClr val="bg1"/>
+                </a:solidFill>
+              </a:rPr>
+              <a:t>Supported by the Ethereum Foundation and a large community of developers worldwide.</a:t>
+            </a:r>
+          </a:p>
+        </p:txBody>
+      </p:sp>
+      <p:pic>
+        <p:nvPicPr>
+          <p:cNvPr id="1032" name="Picture 8" descr="Image result for Ethereum blockchain">
+            <a:extLst>
+              <a:ext uri="{FF2B5EF4-FFF2-40B4-BE49-F238E27FC236}">
+                <a16:creationId xmlns:a16="http://schemas.microsoft.com/office/drawing/2014/main" id="{311E1831-B8CE-4C1F-87DF-A19A432771DB}"/>
+              </a:ext>
+            </a:extLst>
+          </p:cNvPr>
+          <p:cNvPicPr>
+            <a:picLocks noChangeAspect="1" noChangeArrowheads="1"/>
+          </p:cNvPicPr>
+          <p:nvPr/>
+        </p:nvPicPr>
+        <p:blipFill>
+          <a:blip r:embed="rId5">
+            <a:extLst>
+              <a:ext uri="{28A0092B-C50C-407E-A947-70E740481C1C}">
+                <a14:useLocalDpi xmlns:a14="http://schemas.microsoft.com/office/drawing/2010/main" val="0"/>
+              </a:ext>
+            </a:extLst>
+          </a:blip>
+          <a:srcRect/>
+          <a:stretch>
+            <a:fillRect/>
+          </a:stretch>
+        </p:blipFill>
+        <p:spPr bwMode="auto">
+          <a:xfrm>
+            <a:off x="256034" y="4279976"/>
+            <a:ext cx="1865374" cy="1709926"/>
+          </a:xfrm>
+          <a:prstGeom prst="rect">
+            <a:avLst/>
+          </a:prstGeom>
+          <a:noFill/>
+          <a:ln>
+            <a:solidFill>
+              <a:schemeClr val="tx1"/>
+            </a:solidFill>
+          </a:ln>
+          <a:extLst>
+            <a:ext uri="{909E8E84-426E-40DD-AFC4-6F175D3DCCD1}">
+              <a14:hiddenFill xmlns:a14="http://schemas.microsoft.com/office/drawing/2010/main">
+                <a:solidFill>
+                  <a:srgbClr val="FFFFFF"/>
+                </a:solidFill>
+              </a14:hiddenFill>
+            </a:ext>
+          </a:extLst>
+        </p:spPr>
+      </p:pic>
+      <p:sp>
+        <p:nvSpPr>
+          <p:cNvPr id="18" name="Rectangle 17">
+            <a:extLst>
+              <a:ext uri="{FF2B5EF4-FFF2-40B4-BE49-F238E27FC236}">
+                <a16:creationId xmlns:a16="http://schemas.microsoft.com/office/drawing/2014/main" id="{28F20620-1AA3-4F25-AE51-367DAEDE8859}"/>
+              </a:ext>
+            </a:extLst>
+          </p:cNvPr>
+          <p:cNvSpPr/>
+          <p:nvPr/>
+        </p:nvSpPr>
+        <p:spPr>
+          <a:xfrm>
+            <a:off x="6187440" y="4273295"/>
+            <a:ext cx="5541264" cy="1709927"/>
+          </a:xfrm>
+          <a:prstGeom prst="rect">
+            <a:avLst/>
+          </a:prstGeom>
+        </p:spPr>
+        <p:style>
+          <a:lnRef idx="2">
+            <a:schemeClr val="accent1">
+              <a:shade val="50000"/>
+            </a:schemeClr>
+          </a:lnRef>
+          <a:fillRef idx="1">
+            <a:schemeClr val="accent1"/>
+          </a:fillRef>
+          <a:effectRef idx="0">
+            <a:schemeClr val="accent1"/>
+          </a:effectRef>
+          <a:fontRef idx="minor">
+            <a:schemeClr val="lt1"/>
+          </a:fontRef>
+        </p:style>
+        <p:txBody>
+          <a:bodyPr rtlCol="0" anchor="ctr"/>
+          <a:lstStyle/>
+          <a:p>
+            <a:pPr algn="ctr"/>
+            <a:endParaRPr lang="en-US" dirty="0"/>
+          </a:p>
+        </p:txBody>
+      </p:sp>
+    </p:spTree>
+    <p:extLst>
+      <p:ext uri="{BB962C8B-B14F-4D97-AF65-F5344CB8AC3E}">
+        <p14:creationId xmlns:p14="http://schemas.microsoft.com/office/powerpoint/2010/main" val="1459417111"/>
+      </p:ext>
+    </p:extLst>
+  </p:cSld>
+  <p:clrMapOvr>
+    <a:masterClrMapping/>
+  </p:clrMapOvr>
+</p:sld>
+</file>
+
+<file path=ppt/slides/slide7.xml><?xml version="1.0" encoding="utf-8"?>
+<p:sld xmlns:a="http://schemas.openxmlformats.org/drawingml/2006/main" xmlns:r="http://schemas.openxmlformats.org/officeDocument/2006/relationships" xmlns:p="http://schemas.openxmlformats.org/presentationml/2006/main">
+  <p:cSld>
+    <p:spTree>
+      <p:nvGrpSpPr>
+        <p:cNvPr id="1" name=""/>
+        <p:cNvGrpSpPr/>
+        <p:nvPr/>
+      </p:nvGrpSpPr>
+      <p:grpSpPr>
+        <a:xfrm>
+          <a:off x="0" y="0"/>
+          <a:ext cx="0" cy="0"/>
+          <a:chOff x="0" y="0"/>
+          <a:chExt cx="0" cy="0"/>
+        </a:xfrm>
+      </p:grpSpPr>
+      <p:sp>
+        <p:nvSpPr>
           <p:cNvPr id="3" name="Title 2">
             <a:extLst>
               <a:ext uri="{FF2B5EF4-FFF2-40B4-BE49-F238E27FC236}">
@@ -9548,7 +12423,7 @@
 </p:sld>
 </file>
 
-<file path=ppt/slides/slide7.xml><?xml version="1.0" encoding="utf-8"?>
+<file path=ppt/slides/slide8.xml><?xml version="1.0" encoding="utf-8"?>
 <p:sld xmlns:a="http://schemas.openxmlformats.org/drawingml/2006/main" xmlns:r="http://schemas.openxmlformats.org/officeDocument/2006/relationships" xmlns:p="http://schemas.openxmlformats.org/presentationml/2006/main">
   <p:cSld>
     <p:spTree>
@@ -9612,7 +12487,7 @@
         <p:spPr>
           <a:xfrm>
             <a:off x="206685" y="2179633"/>
-            <a:ext cx="6182541" cy="3970476"/>
+            <a:ext cx="6401379" cy="4440064"/>
           </a:xfrm>
         </p:spPr>
         <p:txBody>
@@ -9639,7 +12514,7 @@
             <a:pPr algn="just"/>
             <a:r>
               <a:rPr lang="en-US" sz="2000" dirty="0"/>
-              <a:t>Spin off various nodes (RPC, web3, mine)</a:t>
+              <a:t>Spin off various nodes (RPC, web3, mine).</a:t>
             </a:r>
           </a:p>
           <a:p>
@@ -9648,6 +12523,88 @@
               <a:rPr lang="en-US" sz="2000" dirty="0"/>
               <a:t>Network communication across nodes and Static nodes</a:t>
             </a:r>
+          </a:p>
+          <a:p>
+            <a:pPr algn="just"/>
+            <a:r>
+              <a:rPr lang="en-US" sz="2000" dirty="0"/>
+              <a:t>Each node contains full copy of blockchain </a:t>
+            </a:r>
+            <a:r>
+              <a:rPr lang="en-US" sz="2000" dirty="0" err="1"/>
+              <a:t>db</a:t>
+            </a:r>
+            <a:r>
+              <a:rPr lang="en-US" sz="2000" dirty="0"/>
+              <a:t> which stores a record of every transaction.</a:t>
+            </a:r>
+          </a:p>
+          <a:p>
+            <a:pPr algn="just"/>
+            <a:r>
+              <a:rPr lang="en-US" sz="2000" dirty="0"/>
+              <a:t>Different types of networks</a:t>
+            </a:r>
+          </a:p>
+          <a:p>
+            <a:pPr lvl="1" algn="just"/>
+            <a:r>
+              <a:rPr lang="en-US" sz="1600" dirty="0"/>
+              <a:t>Private </a:t>
+            </a:r>
+            <a:r>
+              <a:rPr lang="en-US" sz="1600" dirty="0" err="1"/>
+              <a:t>Newtorks</a:t>
+            </a:r>
+            <a:endParaRPr lang="en-US" sz="1600" dirty="0"/>
+          </a:p>
+          <a:p>
+            <a:pPr lvl="1" algn="just"/>
+            <a:r>
+              <a:rPr lang="en-US" sz="1600" dirty="0"/>
+              <a:t>Public networks</a:t>
+            </a:r>
+          </a:p>
+          <a:p>
+            <a:pPr lvl="2" algn="just"/>
+            <a:r>
+              <a:rPr lang="en-US" sz="1400" dirty="0"/>
+              <a:t>Main Network (Ether Based)</a:t>
+            </a:r>
+          </a:p>
+          <a:p>
+            <a:pPr lvl="2" algn="just"/>
+            <a:r>
+              <a:rPr lang="en-US" sz="1400" dirty="0">
+                <a:hlinkClick r:id="rId2"/>
+              </a:rPr>
+              <a:t>Test Networks</a:t>
+            </a:r>
+            <a:endParaRPr lang="en-US" sz="1400" dirty="0"/>
+          </a:p>
+          <a:p>
+            <a:pPr lvl="3" algn="just"/>
+            <a:r>
+              <a:rPr lang="en-US" sz="1400" dirty="0" err="1"/>
+              <a:t>Ropsten</a:t>
+            </a:r>
+            <a:endParaRPr lang="en-US" sz="1400" dirty="0"/>
+          </a:p>
+          <a:p>
+            <a:pPr lvl="3" algn="just"/>
+            <a:r>
+              <a:rPr lang="en-US" sz="1400" dirty="0" err="1"/>
+              <a:t>Kovan</a:t>
+            </a:r>
+            <a:endParaRPr lang="en-US" sz="1400" dirty="0"/>
+          </a:p>
+          <a:p>
+            <a:pPr lvl="3" algn="just"/>
+            <a:r>
+              <a:rPr lang="en-US" sz="1400" dirty="0" err="1"/>
+              <a:t>Rinkeby</a:t>
+            </a:r>
+            <a:endParaRPr lang="en-US" sz="1400" dirty="0"/>
           </a:p>
           <a:p>
             <a:pPr algn="just"/>
@@ -9670,7 +12627,7 @@
           <p:nvPr/>
         </p:nvPicPr>
         <p:blipFill>
-          <a:blip r:embed="rId2">
+          <a:blip r:embed="rId3">
             <a:extLst>
               <a:ext uri="{28A0092B-C50C-407E-A947-70E740481C1C}">
                 <a14:useLocalDpi xmlns:a14="http://schemas.microsoft.com/office/drawing/2010/main" val="0"/>
@@ -9715,7 +12672,7 @@
 </p:sld>
 </file>
 
-<file path=ppt/slides/slide8.xml><?xml version="1.0" encoding="utf-8"?>
+<file path=ppt/slides/slide9.xml><?xml version="1.0" encoding="utf-8"?>
 <p:sld xmlns:a="http://schemas.openxmlformats.org/drawingml/2006/main" xmlns:r="http://schemas.openxmlformats.org/officeDocument/2006/relationships" xmlns:p="http://schemas.openxmlformats.org/presentationml/2006/main">
   <p:cSld>
     <p:spTree>
@@ -9732,38 +12689,160 @@
           <a:chExt cx="0" cy="0"/>
         </a:xfrm>
       </p:grpSpPr>
-      <p:sp>
-        <p:nvSpPr>
-          <p:cNvPr id="3" name="Title 2">
-            <a:extLst>
-              <a:ext uri="{FF2B5EF4-FFF2-40B4-BE49-F238E27FC236}">
-                <a16:creationId xmlns:a16="http://schemas.microsoft.com/office/drawing/2014/main" id="{896831CA-31CE-4897-92E9-AFE94FBC4BC6}"/>
-              </a:ext>
-            </a:extLst>
-          </p:cNvPr>
-          <p:cNvSpPr>
-            <a:spLocks noGrp="1"/>
+      <p:pic>
+        <p:nvPicPr>
+          <p:cNvPr id="3" name="Picture 2">
+            <a:extLst>
+              <a:ext uri="{FF2B5EF4-FFF2-40B4-BE49-F238E27FC236}">
+                <a16:creationId xmlns:a16="http://schemas.microsoft.com/office/drawing/2014/main" id="{C568290D-8402-4995-BEA4-FE81C2832328}"/>
+              </a:ext>
+            </a:extLst>
+          </p:cNvPr>
+          <p:cNvPicPr>
+            <a:picLocks noChangeAspect="1"/>
+          </p:cNvPicPr>
+          <p:nvPr/>
+        </p:nvPicPr>
+        <p:blipFill>
+          <a:blip r:embed="rId2"/>
+          <a:stretch>
+            <a:fillRect/>
+          </a:stretch>
+        </p:blipFill>
+        <p:spPr>
+          <a:xfrm>
+            <a:off x="5367170" y="0"/>
+            <a:ext cx="6824830" cy="6858000"/>
+          </a:xfrm>
+          <a:prstGeom prst="rect">
+            <a:avLst/>
+          </a:prstGeom>
+        </p:spPr>
+      </p:pic>
+      <p:sp>
+        <p:nvSpPr>
+          <p:cNvPr id="4" name="Title 2">
+            <a:extLst>
+              <a:ext uri="{FF2B5EF4-FFF2-40B4-BE49-F238E27FC236}">
+                <a16:creationId xmlns:a16="http://schemas.microsoft.com/office/drawing/2014/main" id="{94795480-F3ED-4202-878A-AFCAB21B646C}"/>
+              </a:ext>
+            </a:extLst>
+          </p:cNvPr>
+          <p:cNvSpPr txBox="1">
+            <a:spLocks/>
           </p:cNvSpPr>
-          <p:nvPr>
-            <p:ph type="title"/>
-          </p:nvPr>
-        </p:nvSpPr>
-        <p:spPr/>
-        <p:txBody>
-          <a:bodyPr/>
+          <p:nvPr/>
+        </p:nvSpPr>
+        <p:spPr>
+          <a:xfrm>
+            <a:off x="228600" y="296374"/>
+            <a:ext cx="4062984" cy="1325563"/>
+          </a:xfrm>
+          <a:prstGeom prst="rect">
+            <a:avLst/>
+          </a:prstGeom>
+        </p:spPr>
+        <p:txBody>
+          <a:bodyPr>
+            <a:normAutofit fontScale="75000" lnSpcReduction="20000"/>
+          </a:bodyPr>
+          <a:lstStyle>
+            <a:lvl1pPr algn="l" defTabSz="914400" rtl="0" eaLnBrk="1" latinLnBrk="0" hangingPunct="1">
+              <a:lnSpc>
+                <a:spcPct val="90000"/>
+              </a:lnSpc>
+              <a:spcBef>
+                <a:spcPct val="0"/>
+              </a:spcBef>
+              <a:buNone/>
+              <a:defRPr lang="en-US" sz="4800" b="1" kern="1200" cap="all" baseline="0" smtClean="0">
+                <a:solidFill>
+                  <a:schemeClr val="bg1"/>
+                </a:solidFill>
+                <a:latin typeface="+mj-lt"/>
+                <a:ea typeface="+mj-ea"/>
+                <a:cs typeface="+mj-cs"/>
+              </a:defRPr>
+            </a:lvl1pPr>
+          </a:lstStyle>
+          <a:p>
+            <a:r>
+              <a:rPr lang="en-US">
+                <a:solidFill>
+                  <a:schemeClr val="tx1"/>
+                </a:solidFill>
+              </a:rPr>
+              <a:t>Sample </a:t>
+            </a:r>
+            <a:br>
+              <a:rPr lang="en-US">
+                <a:solidFill>
+                  <a:schemeClr val="tx1"/>
+                </a:solidFill>
+              </a:rPr>
+            </a:br>
+            <a:r>
+              <a:rPr lang="en-US">
+                <a:solidFill>
+                  <a:schemeClr val="tx1"/>
+                </a:solidFill>
+              </a:rPr>
+              <a:t>SOLIDITY Contract</a:t>
+            </a:r>
+            <a:endParaRPr lang="en-US" dirty="0">
+              <a:solidFill>
+                <a:schemeClr val="tx1"/>
+              </a:solidFill>
+            </a:endParaRPr>
+          </a:p>
+        </p:txBody>
+      </p:sp>
+      <p:sp>
+        <p:nvSpPr>
+          <p:cNvPr id="5" name="TextBox 4">
+            <a:extLst>
+              <a:ext uri="{FF2B5EF4-FFF2-40B4-BE49-F238E27FC236}">
+                <a16:creationId xmlns:a16="http://schemas.microsoft.com/office/drawing/2014/main" id="{E6C14285-5399-4E30-8EAD-C571968E88A1}"/>
+              </a:ext>
+            </a:extLst>
+          </p:cNvPr>
+          <p:cNvSpPr txBox="1"/>
+          <p:nvPr/>
+        </p:nvSpPr>
+        <p:spPr>
+          <a:xfrm>
+            <a:off x="326136" y="1437271"/>
+            <a:ext cx="4696968" cy="369332"/>
+          </a:xfrm>
+          <a:prstGeom prst="rect">
+            <a:avLst/>
+          </a:prstGeom>
+          <a:noFill/>
+        </p:spPr>
+        <p:txBody>
+          <a:bodyPr wrap="square" rtlCol="0">
+            <a:spAutoFit/>
+          </a:bodyPr>
           <a:lstStyle/>
           <a:p>
             <a:r>
               <a:rPr lang="en-US" dirty="0"/>
-              <a:t>Sample SOLIDITY Contract</a:t>
-            </a:r>
+              <a:t>Online Editor - </a:t>
+            </a:r>
+            <a:r>
+              <a:rPr lang="en-US" dirty="0">
+                <a:hlinkClick r:id="rId3"/>
+              </a:rPr>
+              <a:t>https://remix.ethereum.org</a:t>
+            </a:r>
+            <a:endParaRPr lang="en-US" dirty="0"/>
           </a:p>
         </p:txBody>
       </p:sp>
     </p:spTree>
     <p:extLst>
       <p:ext uri="{BB962C8B-B14F-4D97-AF65-F5344CB8AC3E}">
-        <p14:creationId xmlns:p14="http://schemas.microsoft.com/office/powerpoint/2010/main" val="1267626819"/>
+        <p14:creationId xmlns:p14="http://schemas.microsoft.com/office/powerpoint/2010/main" val="839419340"/>
       </p:ext>
     </p:extLst>
   </p:cSld>

</xml_diff>